<commit_message>
Start on targets section
</commit_message>
<xml_diff>
--- a/Session 2 - More Advanced CMake.pptx
+++ b/Session 2 - More Advanced CMake.pptx
@@ -4,23 +4,31 @@
   <p:sldMasterIdLst>
     <p:sldMasterId id="2147483648" r:id="rId1"/>
   </p:sldMasterIdLst>
+  <p:notesMasterIdLst>
+    <p:notesMasterId r:id="rId23"/>
+  </p:notesMasterIdLst>
   <p:sldIdLst>
     <p:sldId id="256" r:id="rId2"/>
     <p:sldId id="257" r:id="rId3"/>
     <p:sldId id="260" r:id="rId4"/>
     <p:sldId id="273" r:id="rId5"/>
-    <p:sldId id="262" r:id="rId6"/>
-    <p:sldId id="261" r:id="rId7"/>
-    <p:sldId id="263" r:id="rId8"/>
-    <p:sldId id="264" r:id="rId9"/>
-    <p:sldId id="266" r:id="rId10"/>
-    <p:sldId id="265" r:id="rId11"/>
-    <p:sldId id="267" r:id="rId12"/>
-    <p:sldId id="268" r:id="rId13"/>
-    <p:sldId id="269" r:id="rId14"/>
-    <p:sldId id="270" r:id="rId15"/>
-    <p:sldId id="271" r:id="rId16"/>
-    <p:sldId id="272" r:id="rId17"/>
+    <p:sldId id="274" r:id="rId6"/>
+    <p:sldId id="275" r:id="rId7"/>
+    <p:sldId id="276" r:id="rId8"/>
+    <p:sldId id="277" r:id="rId9"/>
+    <p:sldId id="278" r:id="rId10"/>
+    <p:sldId id="262" r:id="rId11"/>
+    <p:sldId id="261" r:id="rId12"/>
+    <p:sldId id="263" r:id="rId13"/>
+    <p:sldId id="264" r:id="rId14"/>
+    <p:sldId id="266" r:id="rId15"/>
+    <p:sldId id="265" r:id="rId16"/>
+    <p:sldId id="267" r:id="rId17"/>
+    <p:sldId id="268" r:id="rId18"/>
+    <p:sldId id="269" r:id="rId19"/>
+    <p:sldId id="270" r:id="rId20"/>
+    <p:sldId id="271" r:id="rId21"/>
+    <p:sldId id="272" r:id="rId22"/>
   </p:sldIdLst>
   <p:sldSz cx="12192000" cy="6858000"/>
   <p:notesSz cx="6858000" cy="9144000"/>
@@ -127,6 +135,540 @@
 </p:presentation>
 </file>
 
+<file path=ppt/notesMasters/notesMaster1.xml><?xml version="1.0" encoding="utf-8"?>
+<p:notesMaster xmlns:a="http://schemas.openxmlformats.org/drawingml/2006/main" xmlns:r="http://schemas.openxmlformats.org/officeDocument/2006/relationships" xmlns:p="http://schemas.openxmlformats.org/presentationml/2006/main">
+  <p:cSld>
+    <p:bg>
+      <p:bgRef idx="1001">
+        <a:schemeClr val="bg1"/>
+      </p:bgRef>
+    </p:bg>
+    <p:spTree>
+      <p:nvGrpSpPr>
+        <p:cNvPr id="1" name=""/>
+        <p:cNvGrpSpPr/>
+        <p:nvPr/>
+      </p:nvGrpSpPr>
+      <p:grpSpPr>
+        <a:xfrm>
+          <a:off x="0" y="0"/>
+          <a:ext cx="0" cy="0"/>
+          <a:chOff x="0" y="0"/>
+          <a:chExt cx="0" cy="0"/>
+        </a:xfrm>
+      </p:grpSpPr>
+      <p:sp>
+        <p:nvSpPr>
+          <p:cNvPr id="2" name="Header Placeholder 1"/>
+          <p:cNvSpPr>
+            <a:spLocks noGrp="1"/>
+          </p:cNvSpPr>
+          <p:nvPr>
+            <p:ph type="hdr" sz="quarter"/>
+          </p:nvPr>
+        </p:nvSpPr>
+        <p:spPr>
+          <a:xfrm>
+            <a:off x="0" y="0"/>
+            <a:ext cx="2971800" cy="458788"/>
+          </a:xfrm>
+          <a:prstGeom prst="rect">
+            <a:avLst/>
+          </a:prstGeom>
+        </p:spPr>
+        <p:txBody>
+          <a:bodyPr vert="horz" lIns="91440" tIns="45720" rIns="91440" bIns="45720" rtlCol="0"/>
+          <a:lstStyle>
+            <a:lvl1pPr algn="l">
+              <a:defRPr sz="1200"/>
+            </a:lvl1pPr>
+          </a:lstStyle>
+          <a:p>
+            <a:endParaRPr lang="en-US"/>
+          </a:p>
+        </p:txBody>
+      </p:sp>
+      <p:sp>
+        <p:nvSpPr>
+          <p:cNvPr id="3" name="Date Placeholder 2"/>
+          <p:cNvSpPr>
+            <a:spLocks noGrp="1"/>
+          </p:cNvSpPr>
+          <p:nvPr>
+            <p:ph type="dt" idx="1"/>
+          </p:nvPr>
+        </p:nvSpPr>
+        <p:spPr>
+          <a:xfrm>
+            <a:off x="3884613" y="0"/>
+            <a:ext cx="2971800" cy="458788"/>
+          </a:xfrm>
+          <a:prstGeom prst="rect">
+            <a:avLst/>
+          </a:prstGeom>
+        </p:spPr>
+        <p:txBody>
+          <a:bodyPr vert="horz" lIns="91440" tIns="45720" rIns="91440" bIns="45720" rtlCol="0"/>
+          <a:lstStyle>
+            <a:lvl1pPr algn="r">
+              <a:defRPr sz="1200"/>
+            </a:lvl1pPr>
+          </a:lstStyle>
+          <a:p>
+            <a:fld id="{9119D82B-7D8C-4702-9AB7-C4CA421C6492}" type="datetimeFigureOut">
+              <a:rPr lang="en-US" smtClean="0"/>
+              <a:t>6/5/2020</a:t>
+            </a:fld>
+            <a:endParaRPr lang="en-US"/>
+          </a:p>
+        </p:txBody>
+      </p:sp>
+      <p:sp>
+        <p:nvSpPr>
+          <p:cNvPr id="4" name="Slide Image Placeholder 3"/>
+          <p:cNvSpPr>
+            <a:spLocks noGrp="1" noRot="1" noChangeAspect="1"/>
+          </p:cNvSpPr>
+          <p:nvPr>
+            <p:ph type="sldImg" idx="2"/>
+          </p:nvPr>
+        </p:nvSpPr>
+        <p:spPr>
+          <a:xfrm>
+            <a:off x="685800" y="1143000"/>
+            <a:ext cx="5486400" cy="3086100"/>
+          </a:xfrm>
+          <a:prstGeom prst="rect">
+            <a:avLst/>
+          </a:prstGeom>
+          <a:noFill/>
+          <a:ln w="12700">
+            <a:solidFill>
+              <a:prstClr val="black"/>
+            </a:solidFill>
+          </a:ln>
+        </p:spPr>
+        <p:txBody>
+          <a:bodyPr vert="horz" lIns="91440" tIns="45720" rIns="91440" bIns="45720" rtlCol="0" anchor="ctr"/>
+          <a:lstStyle/>
+          <a:p>
+            <a:endParaRPr lang="en-US"/>
+          </a:p>
+        </p:txBody>
+      </p:sp>
+      <p:sp>
+        <p:nvSpPr>
+          <p:cNvPr id="5" name="Notes Placeholder 4"/>
+          <p:cNvSpPr>
+            <a:spLocks noGrp="1"/>
+          </p:cNvSpPr>
+          <p:nvPr>
+            <p:ph type="body" sz="quarter" idx="3"/>
+          </p:nvPr>
+        </p:nvSpPr>
+        <p:spPr>
+          <a:xfrm>
+            <a:off x="685800" y="4400550"/>
+            <a:ext cx="5486400" cy="3600450"/>
+          </a:xfrm>
+          <a:prstGeom prst="rect">
+            <a:avLst/>
+          </a:prstGeom>
+        </p:spPr>
+        <p:txBody>
+          <a:bodyPr vert="horz" lIns="91440" tIns="45720" rIns="91440" bIns="45720" rtlCol="0"/>
+          <a:lstStyle/>
+          <a:p>
+            <a:pPr lvl="0"/>
+            <a:r>
+              <a:rPr lang="en-US"/>
+              <a:t>Click to edit Master text styles</a:t>
+            </a:r>
+          </a:p>
+          <a:p>
+            <a:pPr lvl="1"/>
+            <a:r>
+              <a:rPr lang="en-US"/>
+              <a:t>Second level</a:t>
+            </a:r>
+          </a:p>
+          <a:p>
+            <a:pPr lvl="2"/>
+            <a:r>
+              <a:rPr lang="en-US"/>
+              <a:t>Third level</a:t>
+            </a:r>
+          </a:p>
+          <a:p>
+            <a:pPr lvl="3"/>
+            <a:r>
+              <a:rPr lang="en-US"/>
+              <a:t>Fourth level</a:t>
+            </a:r>
+          </a:p>
+          <a:p>
+            <a:pPr lvl="4"/>
+            <a:r>
+              <a:rPr lang="en-US"/>
+              <a:t>Fifth level</a:t>
+            </a:r>
+          </a:p>
+        </p:txBody>
+      </p:sp>
+      <p:sp>
+        <p:nvSpPr>
+          <p:cNvPr id="6" name="Footer Placeholder 5"/>
+          <p:cNvSpPr>
+            <a:spLocks noGrp="1"/>
+          </p:cNvSpPr>
+          <p:nvPr>
+            <p:ph type="ftr" sz="quarter" idx="4"/>
+          </p:nvPr>
+        </p:nvSpPr>
+        <p:spPr>
+          <a:xfrm>
+            <a:off x="0" y="8685213"/>
+            <a:ext cx="2971800" cy="458787"/>
+          </a:xfrm>
+          <a:prstGeom prst="rect">
+            <a:avLst/>
+          </a:prstGeom>
+        </p:spPr>
+        <p:txBody>
+          <a:bodyPr vert="horz" lIns="91440" tIns="45720" rIns="91440" bIns="45720" rtlCol="0" anchor="b"/>
+          <a:lstStyle>
+            <a:lvl1pPr algn="l">
+              <a:defRPr sz="1200"/>
+            </a:lvl1pPr>
+          </a:lstStyle>
+          <a:p>
+            <a:endParaRPr lang="en-US"/>
+          </a:p>
+        </p:txBody>
+      </p:sp>
+      <p:sp>
+        <p:nvSpPr>
+          <p:cNvPr id="7" name="Slide Number Placeholder 6"/>
+          <p:cNvSpPr>
+            <a:spLocks noGrp="1"/>
+          </p:cNvSpPr>
+          <p:nvPr>
+            <p:ph type="sldNum" sz="quarter" idx="5"/>
+          </p:nvPr>
+        </p:nvSpPr>
+        <p:spPr>
+          <a:xfrm>
+            <a:off x="3884613" y="8685213"/>
+            <a:ext cx="2971800" cy="458787"/>
+          </a:xfrm>
+          <a:prstGeom prst="rect">
+            <a:avLst/>
+          </a:prstGeom>
+        </p:spPr>
+        <p:txBody>
+          <a:bodyPr vert="horz" lIns="91440" tIns="45720" rIns="91440" bIns="45720" rtlCol="0" anchor="b"/>
+          <a:lstStyle>
+            <a:lvl1pPr algn="r">
+              <a:defRPr sz="1200"/>
+            </a:lvl1pPr>
+          </a:lstStyle>
+          <a:p>
+            <a:fld id="{74302781-590A-4CBF-960D-90CCD9B921AE}" type="slidenum">
+              <a:rPr lang="en-US" smtClean="0"/>
+              <a:t>‹#›</a:t>
+            </a:fld>
+            <a:endParaRPr lang="en-US"/>
+          </a:p>
+        </p:txBody>
+      </p:sp>
+    </p:spTree>
+    <p:extLst>
+      <p:ext uri="{BB962C8B-B14F-4D97-AF65-F5344CB8AC3E}">
+        <p14:creationId xmlns:p14="http://schemas.microsoft.com/office/powerpoint/2010/main" val="62994455"/>
+      </p:ext>
+    </p:extLst>
+  </p:cSld>
+  <p:clrMap bg1="lt1" tx1="dk1" bg2="lt2" tx2="dk2" accent1="accent1" accent2="accent2" accent3="accent3" accent4="accent4" accent5="accent5" accent6="accent6" hlink="hlink" folHlink="folHlink"/>
+  <p:notesStyle>
+    <a:lvl1pPr marL="0" algn="l" defTabSz="914400" rtl="0" eaLnBrk="1" latinLnBrk="0" hangingPunct="1">
+      <a:defRPr sz="1200" kern="1200">
+        <a:solidFill>
+          <a:schemeClr val="tx1"/>
+        </a:solidFill>
+        <a:latin typeface="+mn-lt"/>
+        <a:ea typeface="+mn-ea"/>
+        <a:cs typeface="+mn-cs"/>
+      </a:defRPr>
+    </a:lvl1pPr>
+    <a:lvl2pPr marL="457200" algn="l" defTabSz="914400" rtl="0" eaLnBrk="1" latinLnBrk="0" hangingPunct="1">
+      <a:defRPr sz="1200" kern="1200">
+        <a:solidFill>
+          <a:schemeClr val="tx1"/>
+        </a:solidFill>
+        <a:latin typeface="+mn-lt"/>
+        <a:ea typeface="+mn-ea"/>
+        <a:cs typeface="+mn-cs"/>
+      </a:defRPr>
+    </a:lvl2pPr>
+    <a:lvl3pPr marL="914400" algn="l" defTabSz="914400" rtl="0" eaLnBrk="1" latinLnBrk="0" hangingPunct="1">
+      <a:defRPr sz="1200" kern="1200">
+        <a:solidFill>
+          <a:schemeClr val="tx1"/>
+        </a:solidFill>
+        <a:latin typeface="+mn-lt"/>
+        <a:ea typeface="+mn-ea"/>
+        <a:cs typeface="+mn-cs"/>
+      </a:defRPr>
+    </a:lvl3pPr>
+    <a:lvl4pPr marL="1371600" algn="l" defTabSz="914400" rtl="0" eaLnBrk="1" latinLnBrk="0" hangingPunct="1">
+      <a:defRPr sz="1200" kern="1200">
+        <a:solidFill>
+          <a:schemeClr val="tx1"/>
+        </a:solidFill>
+        <a:latin typeface="+mn-lt"/>
+        <a:ea typeface="+mn-ea"/>
+        <a:cs typeface="+mn-cs"/>
+      </a:defRPr>
+    </a:lvl4pPr>
+    <a:lvl5pPr marL="1828800" algn="l" defTabSz="914400" rtl="0" eaLnBrk="1" latinLnBrk="0" hangingPunct="1">
+      <a:defRPr sz="1200" kern="1200">
+        <a:solidFill>
+          <a:schemeClr val="tx1"/>
+        </a:solidFill>
+        <a:latin typeface="+mn-lt"/>
+        <a:ea typeface="+mn-ea"/>
+        <a:cs typeface="+mn-cs"/>
+      </a:defRPr>
+    </a:lvl5pPr>
+    <a:lvl6pPr marL="2286000" algn="l" defTabSz="914400" rtl="0" eaLnBrk="1" latinLnBrk="0" hangingPunct="1">
+      <a:defRPr sz="1200" kern="1200">
+        <a:solidFill>
+          <a:schemeClr val="tx1"/>
+        </a:solidFill>
+        <a:latin typeface="+mn-lt"/>
+        <a:ea typeface="+mn-ea"/>
+        <a:cs typeface="+mn-cs"/>
+      </a:defRPr>
+    </a:lvl6pPr>
+    <a:lvl7pPr marL="2743200" algn="l" defTabSz="914400" rtl="0" eaLnBrk="1" latinLnBrk="0" hangingPunct="1">
+      <a:defRPr sz="1200" kern="1200">
+        <a:solidFill>
+          <a:schemeClr val="tx1"/>
+        </a:solidFill>
+        <a:latin typeface="+mn-lt"/>
+        <a:ea typeface="+mn-ea"/>
+        <a:cs typeface="+mn-cs"/>
+      </a:defRPr>
+    </a:lvl7pPr>
+    <a:lvl8pPr marL="3200400" algn="l" defTabSz="914400" rtl="0" eaLnBrk="1" latinLnBrk="0" hangingPunct="1">
+      <a:defRPr sz="1200" kern="1200">
+        <a:solidFill>
+          <a:schemeClr val="tx1"/>
+        </a:solidFill>
+        <a:latin typeface="+mn-lt"/>
+        <a:ea typeface="+mn-ea"/>
+        <a:cs typeface="+mn-cs"/>
+      </a:defRPr>
+    </a:lvl8pPr>
+    <a:lvl9pPr marL="3657600" algn="l" defTabSz="914400" rtl="0" eaLnBrk="1" latinLnBrk="0" hangingPunct="1">
+      <a:defRPr sz="1200" kern="1200">
+        <a:solidFill>
+          <a:schemeClr val="tx1"/>
+        </a:solidFill>
+        <a:latin typeface="+mn-lt"/>
+        <a:ea typeface="+mn-ea"/>
+        <a:cs typeface="+mn-cs"/>
+      </a:defRPr>
+    </a:lvl9pPr>
+  </p:notesStyle>
+</p:notesMaster>
+</file>
+
+<file path=ppt/notesSlides/notesSlide1.xml><?xml version="1.0" encoding="utf-8"?>
+<p:notes xmlns:a="http://schemas.openxmlformats.org/drawingml/2006/main" xmlns:r="http://schemas.openxmlformats.org/officeDocument/2006/relationships" xmlns:p="http://schemas.openxmlformats.org/presentationml/2006/main">
+  <p:cSld>
+    <p:spTree>
+      <p:nvGrpSpPr>
+        <p:cNvPr id="1" name=""/>
+        <p:cNvGrpSpPr/>
+        <p:nvPr/>
+      </p:nvGrpSpPr>
+      <p:grpSpPr>
+        <a:xfrm>
+          <a:off x="0" y="0"/>
+          <a:ext cx="0" cy="0"/>
+          <a:chOff x="0" y="0"/>
+          <a:chExt cx="0" cy="0"/>
+        </a:xfrm>
+      </p:grpSpPr>
+      <p:sp>
+        <p:nvSpPr>
+          <p:cNvPr id="2" name="Slide Image Placeholder 1"/>
+          <p:cNvSpPr>
+            <a:spLocks noGrp="1" noRot="1" noChangeAspect="1"/>
+          </p:cNvSpPr>
+          <p:nvPr>
+            <p:ph type="sldImg"/>
+          </p:nvPr>
+        </p:nvSpPr>
+        <p:spPr/>
+      </p:sp>
+      <p:sp>
+        <p:nvSpPr>
+          <p:cNvPr id="3" name="Notes Placeholder 2"/>
+          <p:cNvSpPr>
+            <a:spLocks noGrp="1"/>
+          </p:cNvSpPr>
+          <p:nvPr>
+            <p:ph type="body" idx="1"/>
+          </p:nvPr>
+        </p:nvSpPr>
+        <p:spPr/>
+        <p:txBody>
+          <a:bodyPr/>
+          <a:lstStyle/>
+          <a:p>
+            <a:pPr marL="171450" indent="-171450">
+              <a:buFont typeface="Arial" panose="020B0604020202020204" pitchFamily="34" charset="0"/>
+              <a:buChar char="•"/>
+            </a:pPr>
+            <a:r>
+              <a:rPr lang="en-US" dirty="0"/>
+              <a:t>2000: </a:t>
+            </a:r>
+            <a:r>
+              <a:rPr lang="en-US" dirty="0" err="1"/>
+              <a:t>Kitware</a:t>
+            </a:r>
+            <a:r>
+              <a:rPr lang="en-US" dirty="0"/>
+              <a:t> contracted to develop a new build system for a bioinformatics program called ITK: a Cross-platform Make</a:t>
+            </a:r>
+          </a:p>
+          <a:p>
+            <a:pPr marL="628650" lvl="1" indent="-171450">
+              <a:buFont typeface="Arial" panose="020B0604020202020204" pitchFamily="34" charset="0"/>
+              <a:buChar char="•"/>
+            </a:pPr>
+            <a:r>
+              <a:rPr lang="en-US" dirty="0"/>
+              <a:t>Had to be able to read in a buildscript in a single format and generate </a:t>
+            </a:r>
+            <a:r>
+              <a:rPr lang="en-US" dirty="0" err="1"/>
+              <a:t>Makefiles</a:t>
+            </a:r>
+            <a:r>
+              <a:rPr lang="en-US" dirty="0"/>
+              <a:t> for Linux and Visual Studio project files for Windows</a:t>
+            </a:r>
+          </a:p>
+          <a:p>
+            <a:pPr marL="628650" lvl="1" indent="-171450">
+              <a:buFont typeface="Arial" panose="020B0604020202020204" pitchFamily="34" charset="0"/>
+              <a:buChar char="•"/>
+            </a:pPr>
+            <a:r>
+              <a:rPr lang="en-US" dirty="0"/>
+              <a:t>Needed to support complex configurations, 3</a:t>
+            </a:r>
+            <a:r>
+              <a:rPr lang="en-US" baseline="30000" dirty="0"/>
+              <a:t>rd</a:t>
+            </a:r>
+            <a:r>
+              <a:rPr lang="en-US" dirty="0"/>
+              <a:t> party libraries, and custom commands which generate source files</a:t>
+            </a:r>
+          </a:p>
+          <a:p>
+            <a:pPr marL="171450" indent="-171450">
+              <a:buFont typeface="Arial" panose="020B0604020202020204" pitchFamily="34" charset="0"/>
+              <a:buChar char="•"/>
+            </a:pPr>
+            <a:r>
+              <a:rPr lang="en-US" dirty="0"/>
+              <a:t>The CMake of the early 00s was very different from what we know today.  It used an almost completely different set of commands, most of which operated at the global scope</a:t>
+            </a:r>
+          </a:p>
+          <a:p>
+            <a:pPr marL="171450" indent="-171450">
+              <a:buFont typeface="Arial" panose="020B0604020202020204" pitchFamily="34" charset="0"/>
+              <a:buChar char="•"/>
+            </a:pPr>
+            <a:r>
+              <a:rPr lang="en-US" dirty="0"/>
+              <a:t>2006: Massive KDE project (Linux desktop environment) switches its entire build system to CMake and gives it rave reviews.  Many other open-source projects begin to follow suit over the next few years.</a:t>
+            </a:r>
+          </a:p>
+          <a:p>
+            <a:pPr marL="171450" indent="-171450">
+              <a:buFont typeface="Arial" panose="020B0604020202020204" pitchFamily="34" charset="0"/>
+              <a:buChar char="•"/>
+            </a:pPr>
+            <a:r>
+              <a:rPr lang="en-US" dirty="0"/>
+              <a:t>2014: CMake 3.0 is released, introducing many of the features we use as standard today.</a:t>
+            </a:r>
+          </a:p>
+          <a:p>
+            <a:pPr marL="171450" indent="-171450">
+              <a:buFont typeface="Arial" panose="020B0604020202020204" pitchFamily="34" charset="0"/>
+              <a:buChar char="•"/>
+            </a:pPr>
+            <a:r>
+              <a:rPr lang="en-US" dirty="0"/>
+              <a:t>More good info: </a:t>
+            </a:r>
+            <a:r>
+              <a:rPr lang="en-US" dirty="0">
+                <a:hlinkClick r:id="rId3"/>
+              </a:rPr>
+              <a:t>https://www.aosabook.org/en/cmake.html</a:t>
+            </a:r>
+            <a:endParaRPr lang="en-US" dirty="0"/>
+          </a:p>
+          <a:p>
+            <a:endParaRPr lang="en-US" dirty="0"/>
+          </a:p>
+        </p:txBody>
+      </p:sp>
+      <p:sp>
+        <p:nvSpPr>
+          <p:cNvPr id="4" name="Slide Number Placeholder 3"/>
+          <p:cNvSpPr>
+            <a:spLocks noGrp="1"/>
+          </p:cNvSpPr>
+          <p:nvPr>
+            <p:ph type="sldNum" sz="quarter" idx="5"/>
+          </p:nvPr>
+        </p:nvSpPr>
+        <p:spPr/>
+        <p:txBody>
+          <a:bodyPr/>
+          <a:lstStyle/>
+          <a:p>
+            <a:fld id="{74302781-590A-4CBF-960D-90CCD9B921AE}" type="slidenum">
+              <a:rPr lang="en-US" smtClean="0"/>
+              <a:t>2</a:t>
+            </a:fld>
+            <a:endParaRPr lang="en-US"/>
+          </a:p>
+        </p:txBody>
+      </p:sp>
+    </p:spTree>
+    <p:extLst>
+      <p:ext uri="{BB962C8B-B14F-4D97-AF65-F5344CB8AC3E}">
+        <p14:creationId xmlns:p14="http://schemas.microsoft.com/office/powerpoint/2010/main" val="1112103874"/>
+      </p:ext>
+    </p:extLst>
+  </p:cSld>
+  <p:clrMapOvr>
+    <a:masterClrMapping/>
+  </p:clrMapOvr>
+</p:notes>
+</file>
+
 <file path=ppt/slideLayouts/slideLayout1.xml><?xml version="1.0" encoding="utf-8"?>
 <p:sldLayout xmlns:a="http://schemas.openxmlformats.org/drawingml/2006/main" xmlns:r="http://schemas.openxmlformats.org/officeDocument/2006/relationships" xmlns:p="http://schemas.openxmlformats.org/presentationml/2006/main" type="title" preserve="1">
   <p:cSld name="Title Slide">
@@ -357,7 +899,7 @@
             <a:fld id="{B61BEF0D-F0BB-DE4B-95CE-6DB70DBA9567}" type="datetimeFigureOut">
               <a:rPr lang="en-US" dirty="0"/>
               <a:pPr/>
-              <a:t>4/2/2020</a:t>
+              <a:t>6/5/2020</a:t>
             </a:fld>
             <a:endParaRPr lang="en-US" dirty="0"/>
           </a:p>
@@ -688,7 +1230,7 @@
             <a:fld id="{B61BEF0D-F0BB-DE4B-95CE-6DB70DBA9567}" type="datetimeFigureOut">
               <a:rPr lang="en-US" dirty="0"/>
               <a:pPr/>
-              <a:t>4/2/2020</a:t>
+              <a:t>6/5/2020</a:t>
             </a:fld>
             <a:endParaRPr lang="en-US" dirty="0"/>
           </a:p>
@@ -963,7 +1505,7 @@
             <a:fld id="{B61BEF0D-F0BB-DE4B-95CE-6DB70DBA9567}" type="datetimeFigureOut">
               <a:rPr lang="en-US" dirty="0"/>
               <a:pPr/>
-              <a:t>4/2/2020</a:t>
+              <a:t>6/5/2020</a:t>
             </a:fld>
             <a:endParaRPr lang="en-US" dirty="0"/>
           </a:p>
@@ -1528,7 +2070,7 @@
             <a:fld id="{B61BEF0D-F0BB-DE4B-95CE-6DB70DBA9567}" type="datetimeFigureOut">
               <a:rPr lang="en-US" dirty="0"/>
               <a:pPr/>
-              <a:t>4/2/2020</a:t>
+              <a:t>6/5/2020</a:t>
             </a:fld>
             <a:endParaRPr lang="en-US" dirty="0"/>
           </a:p>
@@ -1803,7 +2345,7 @@
             <a:fld id="{B61BEF0D-F0BB-DE4B-95CE-6DB70DBA9567}" type="datetimeFigureOut">
               <a:rPr lang="en-US" dirty="0"/>
               <a:pPr/>
-              <a:t>4/2/2020</a:t>
+              <a:t>6/5/2020</a:t>
             </a:fld>
             <a:endParaRPr lang="en-US" dirty="0"/>
           </a:p>
@@ -2362,7 +2904,7 @@
             <a:fld id="{B61BEF0D-F0BB-DE4B-95CE-6DB70DBA9567}" type="datetimeFigureOut">
               <a:rPr lang="en-US" dirty="0"/>
               <a:pPr/>
-              <a:t>4/2/2020</a:t>
+              <a:t>6/5/2020</a:t>
             </a:fld>
             <a:endParaRPr lang="en-US" dirty="0"/>
           </a:p>
@@ -2686,7 +3228,7 @@
             <a:fld id="{B61BEF0D-F0BB-DE4B-95CE-6DB70DBA9567}" type="datetimeFigureOut">
               <a:rPr lang="en-US" dirty="0"/>
               <a:pPr/>
-              <a:t>4/2/2020</a:t>
+              <a:t>6/5/2020</a:t>
             </a:fld>
             <a:endParaRPr lang="en-US" dirty="0"/>
           </a:p>
@@ -2860,7 +3402,7 @@
             <a:fld id="{B61BEF0D-F0BB-DE4B-95CE-6DB70DBA9567}" type="datetimeFigureOut">
               <a:rPr lang="en-US" dirty="0"/>
               <a:pPr/>
-              <a:t>4/2/2020</a:t>
+              <a:t>6/5/2020</a:t>
             </a:fld>
             <a:endParaRPr lang="en-US" dirty="0"/>
           </a:p>
@@ -3095,7 +3637,7 @@
             <a:fld id="{B61BEF0D-F0BB-DE4B-95CE-6DB70DBA9567}" type="datetimeFigureOut">
               <a:rPr lang="en-US" dirty="0"/>
               <a:pPr/>
-              <a:t>4/2/2020</a:t>
+              <a:t>6/5/2020</a:t>
             </a:fld>
             <a:endParaRPr lang="en-US" dirty="0"/>
           </a:p>
@@ -3292,7 +3834,7 @@
             <a:fld id="{B61BEF0D-F0BB-DE4B-95CE-6DB70DBA9567}" type="datetimeFigureOut">
               <a:rPr lang="en-US" dirty="0"/>
               <a:pPr/>
-              <a:t>4/2/2020</a:t>
+              <a:t>6/5/2020</a:t>
             </a:fld>
             <a:endParaRPr lang="en-US" dirty="0"/>
           </a:p>
@@ -3566,7 +4108,7 @@
             <a:fld id="{B61BEF0D-F0BB-DE4B-95CE-6DB70DBA9567}" type="datetimeFigureOut">
               <a:rPr lang="en-US" dirty="0"/>
               <a:pPr/>
-              <a:t>4/2/2020</a:t>
+              <a:t>6/5/2020</a:t>
             </a:fld>
             <a:endParaRPr lang="en-US" dirty="0"/>
           </a:p>
@@ -3829,7 +4371,7 @@
             <a:fld id="{B61BEF0D-F0BB-DE4B-95CE-6DB70DBA9567}" type="datetimeFigureOut">
               <a:rPr lang="en-US" dirty="0"/>
               <a:pPr/>
-              <a:t>4/2/2020</a:t>
+              <a:t>6/5/2020</a:t>
             </a:fld>
             <a:endParaRPr lang="en-US" dirty="0"/>
           </a:p>
@@ -4200,7 +4742,7 @@
             <a:fld id="{B61BEF0D-F0BB-DE4B-95CE-6DB70DBA9567}" type="datetimeFigureOut">
               <a:rPr lang="en-US" dirty="0"/>
               <a:pPr/>
-              <a:t>4/2/2020</a:t>
+              <a:t>6/5/2020</a:t>
             </a:fld>
             <a:endParaRPr lang="en-US" dirty="0"/>
           </a:p>
@@ -4345,7 +4887,7 @@
             <a:fld id="{B61BEF0D-F0BB-DE4B-95CE-6DB70DBA9567}" type="datetimeFigureOut">
               <a:rPr lang="en-US" dirty="0"/>
               <a:pPr/>
-              <a:t>4/2/2020</a:t>
+              <a:t>6/5/2020</a:t>
             </a:fld>
             <a:endParaRPr lang="en-US" dirty="0"/>
           </a:p>
@@ -4467,7 +5009,7 @@
             <a:fld id="{B61BEF0D-F0BB-DE4B-95CE-6DB70DBA9567}" type="datetimeFigureOut">
               <a:rPr lang="en-US" dirty="0"/>
               <a:pPr/>
-              <a:t>4/2/2020</a:t>
+              <a:t>6/5/2020</a:t>
             </a:fld>
             <a:endParaRPr lang="en-US" dirty="0"/>
           </a:p>
@@ -4749,7 +5291,7 @@
             <a:fld id="{B61BEF0D-F0BB-DE4B-95CE-6DB70DBA9567}" type="datetimeFigureOut">
               <a:rPr lang="en-US" dirty="0"/>
               <a:pPr/>
-              <a:t>4/2/2020</a:t>
+              <a:t>6/5/2020</a:t>
             </a:fld>
             <a:endParaRPr lang="en-US" dirty="0"/>
           </a:p>
@@ -5070,7 +5612,7 @@
             <a:fld id="{B61BEF0D-F0BB-DE4B-95CE-6DB70DBA9567}" type="datetimeFigureOut">
               <a:rPr lang="en-US" dirty="0"/>
               <a:pPr/>
-              <a:t>4/2/2020</a:t>
+              <a:t>6/5/2020</a:t>
             </a:fld>
             <a:endParaRPr lang="en-US" dirty="0"/>
           </a:p>
@@ -5279,7 +5821,7 @@
             <a:fld id="{B61BEF0D-F0BB-DE4B-95CE-6DB70DBA9567}" type="datetimeFigureOut">
               <a:rPr lang="en-US" dirty="0"/>
               <a:pPr/>
-              <a:t>4/2/2020</a:t>
+              <a:t>6/5/2020</a:t>
             </a:fld>
             <a:endParaRPr lang="en-US" dirty="0"/>
           </a:p>
@@ -5929,6 +6471,617 @@
           <p:cNvPr id="2" name="Title 1">
             <a:extLst>
               <a:ext uri="{FF2B5EF4-FFF2-40B4-BE49-F238E27FC236}">
+                <a16:creationId xmlns:a16="http://schemas.microsoft.com/office/drawing/2014/main" id="{E0A529B2-0B54-4C1F-8CAB-08483B972F13}"/>
+              </a:ext>
+            </a:extLst>
+          </p:cNvPr>
+          <p:cNvSpPr>
+            <a:spLocks noGrp="1"/>
+          </p:cNvSpPr>
+          <p:nvPr>
+            <p:ph type="title"/>
+          </p:nvPr>
+        </p:nvSpPr>
+        <p:spPr/>
+        <p:txBody>
+          <a:bodyPr/>
+          <a:lstStyle/>
+          <a:p>
+            <a:r>
+              <a:rPr lang="en-US" dirty="0"/>
+              <a:t>Part 2</a:t>
+            </a:r>
+          </a:p>
+        </p:txBody>
+      </p:sp>
+      <p:sp>
+        <p:nvSpPr>
+          <p:cNvPr id="3" name="Text Placeholder 2">
+            <a:extLst>
+              <a:ext uri="{FF2B5EF4-FFF2-40B4-BE49-F238E27FC236}">
+                <a16:creationId xmlns:a16="http://schemas.microsoft.com/office/drawing/2014/main" id="{45B44E9B-E012-42F2-937C-6565BA8EDAF4}"/>
+              </a:ext>
+            </a:extLst>
+          </p:cNvPr>
+          <p:cNvSpPr>
+            <a:spLocks noGrp="1"/>
+          </p:cNvSpPr>
+          <p:nvPr>
+            <p:ph type="body" idx="1"/>
+          </p:nvPr>
+        </p:nvSpPr>
+        <p:spPr/>
+        <p:txBody>
+          <a:bodyPr/>
+          <a:lstStyle/>
+          <a:p>
+            <a:r>
+              <a:rPr lang="en-US" dirty="0"/>
+              <a:t>Build Types and Compile Flags</a:t>
+            </a:r>
+          </a:p>
+        </p:txBody>
+      </p:sp>
+    </p:spTree>
+    <p:extLst>
+      <p:ext uri="{BB962C8B-B14F-4D97-AF65-F5344CB8AC3E}">
+        <p14:creationId xmlns:p14="http://schemas.microsoft.com/office/powerpoint/2010/main" val="1076355408"/>
+      </p:ext>
+    </p:extLst>
+  </p:cSld>
+  <p:clrMapOvr>
+    <a:masterClrMapping/>
+  </p:clrMapOvr>
+</p:sld>
+</file>
+
+<file path=ppt/slides/slide11.xml><?xml version="1.0" encoding="utf-8"?>
+<p:sld xmlns:a="http://schemas.openxmlformats.org/drawingml/2006/main" xmlns:r="http://schemas.openxmlformats.org/officeDocument/2006/relationships" xmlns:p="http://schemas.openxmlformats.org/presentationml/2006/main">
+  <p:cSld>
+    <p:spTree>
+      <p:nvGrpSpPr>
+        <p:cNvPr id="1" name=""/>
+        <p:cNvGrpSpPr/>
+        <p:nvPr/>
+      </p:nvGrpSpPr>
+      <p:grpSpPr>
+        <a:xfrm>
+          <a:off x="0" y="0"/>
+          <a:ext cx="0" cy="0"/>
+          <a:chOff x="0" y="0"/>
+          <a:chExt cx="0" cy="0"/>
+        </a:xfrm>
+      </p:grpSpPr>
+      <p:sp>
+        <p:nvSpPr>
+          <p:cNvPr id="2" name="Title 1">
+            <a:extLst>
+              <a:ext uri="{FF2B5EF4-FFF2-40B4-BE49-F238E27FC236}">
+                <a16:creationId xmlns:a16="http://schemas.microsoft.com/office/drawing/2014/main" id="{55868575-3DCF-4655-BAF9-6169FA49734C}"/>
+              </a:ext>
+            </a:extLst>
+          </p:cNvPr>
+          <p:cNvSpPr>
+            <a:spLocks noGrp="1"/>
+          </p:cNvSpPr>
+          <p:nvPr>
+            <p:ph type="title"/>
+          </p:nvPr>
+        </p:nvSpPr>
+        <p:spPr/>
+        <p:txBody>
+          <a:bodyPr/>
+          <a:lstStyle/>
+          <a:p>
+            <a:r>
+              <a:rPr lang="en-US" dirty="0"/>
+              <a:t>The Weirdness that is Cache Variables</a:t>
+            </a:r>
+          </a:p>
+        </p:txBody>
+      </p:sp>
+      <p:sp>
+        <p:nvSpPr>
+          <p:cNvPr id="3" name="Content Placeholder 2">
+            <a:extLst>
+              <a:ext uri="{FF2B5EF4-FFF2-40B4-BE49-F238E27FC236}">
+                <a16:creationId xmlns:a16="http://schemas.microsoft.com/office/drawing/2014/main" id="{7625972D-D6FB-410F-9599-57DFF0E01E30}"/>
+              </a:ext>
+            </a:extLst>
+          </p:cNvPr>
+          <p:cNvSpPr>
+            <a:spLocks noGrp="1"/>
+          </p:cNvSpPr>
+          <p:nvPr>
+            <p:ph idx="1"/>
+          </p:nvPr>
+        </p:nvSpPr>
+        <p:spPr/>
+        <p:txBody>
+          <a:bodyPr/>
+          <a:lstStyle/>
+          <a:p>
+            <a:r>
+              <a:rPr lang="en-US" dirty="0"/>
+              <a:t>Like all build systems, CMake provides a way for you to pass command line options that affect the build system’s behavior</a:t>
+            </a:r>
+          </a:p>
+          <a:p>
+            <a:r>
+              <a:rPr lang="en-US" dirty="0"/>
+              <a:t>It’s also desirable to have a way to store the results of different tests so the buildscript runs faster when you run it subsequent times</a:t>
+            </a:r>
+          </a:p>
+          <a:p>
+            <a:r>
+              <a:rPr lang="en-US" dirty="0"/>
+              <a:t>For CMake, both of these are achieved through the same mechanism: cache variables</a:t>
+            </a:r>
+          </a:p>
+          <a:p>
+            <a:r>
+              <a:rPr lang="en-US" dirty="0"/>
+              <a:t>Cache variables are special variables that keep their values between invocations of CMake</a:t>
+            </a:r>
+          </a:p>
+        </p:txBody>
+      </p:sp>
+    </p:spTree>
+    <p:extLst>
+      <p:ext uri="{BB962C8B-B14F-4D97-AF65-F5344CB8AC3E}">
+        <p14:creationId xmlns:p14="http://schemas.microsoft.com/office/powerpoint/2010/main" val="270943617"/>
+      </p:ext>
+    </p:extLst>
+  </p:cSld>
+  <p:clrMapOvr>
+    <a:masterClrMapping/>
+  </p:clrMapOvr>
+</p:sld>
+</file>
+
+<file path=ppt/slides/slide12.xml><?xml version="1.0" encoding="utf-8"?>
+<p:sld xmlns:a="http://schemas.openxmlformats.org/drawingml/2006/main" xmlns:r="http://schemas.openxmlformats.org/officeDocument/2006/relationships" xmlns:p="http://schemas.openxmlformats.org/presentationml/2006/main">
+  <p:cSld>
+    <p:spTree>
+      <p:nvGrpSpPr>
+        <p:cNvPr id="1" name=""/>
+        <p:cNvGrpSpPr/>
+        <p:nvPr/>
+      </p:nvGrpSpPr>
+      <p:grpSpPr>
+        <a:xfrm>
+          <a:off x="0" y="0"/>
+          <a:ext cx="0" cy="0"/>
+          <a:chOff x="0" y="0"/>
+          <a:chExt cx="0" cy="0"/>
+        </a:xfrm>
+      </p:grpSpPr>
+      <p:sp>
+        <p:nvSpPr>
+          <p:cNvPr id="2" name="Title 1">
+            <a:extLst>
+              <a:ext uri="{FF2B5EF4-FFF2-40B4-BE49-F238E27FC236}">
+                <a16:creationId xmlns:a16="http://schemas.microsoft.com/office/drawing/2014/main" id="{98B3228E-67E9-4BE2-B414-F7C88A23926C}"/>
+              </a:ext>
+            </a:extLst>
+          </p:cNvPr>
+          <p:cNvSpPr>
+            <a:spLocks noGrp="1"/>
+          </p:cNvSpPr>
+          <p:nvPr>
+            <p:ph type="title"/>
+          </p:nvPr>
+        </p:nvSpPr>
+        <p:spPr/>
+        <p:txBody>
+          <a:bodyPr/>
+          <a:lstStyle/>
+          <a:p>
+            <a:r>
+              <a:rPr lang="en-US" dirty="0"/>
+              <a:t>Creating Cache Variables</a:t>
+            </a:r>
+          </a:p>
+        </p:txBody>
+      </p:sp>
+      <p:sp>
+        <p:nvSpPr>
+          <p:cNvPr id="3" name="Content Placeholder 2">
+            <a:extLst>
+              <a:ext uri="{FF2B5EF4-FFF2-40B4-BE49-F238E27FC236}">
+                <a16:creationId xmlns:a16="http://schemas.microsoft.com/office/drawing/2014/main" id="{6AEAB6F2-060F-4466-9BE0-E1E41F279D74}"/>
+              </a:ext>
+            </a:extLst>
+          </p:cNvPr>
+          <p:cNvSpPr>
+            <a:spLocks noGrp="1"/>
+          </p:cNvSpPr>
+          <p:nvPr>
+            <p:ph idx="1"/>
+          </p:nvPr>
+        </p:nvSpPr>
+        <p:spPr>
+          <a:xfrm>
+            <a:off x="685801" y="1799112"/>
+            <a:ext cx="10131425" cy="4576973"/>
+          </a:xfrm>
+        </p:spPr>
+        <p:txBody>
+          <a:bodyPr>
+            <a:normAutofit/>
+          </a:bodyPr>
+          <a:lstStyle/>
+          <a:p>
+            <a:r>
+              <a:rPr lang="en-US" dirty="0"/>
+              <a:t>Cache variables are created using an alternate signature for set().</a:t>
+            </a:r>
+          </a:p>
+          <a:p>
+            <a:r>
+              <a:rPr lang="en-US" dirty="0"/>
+              <a:t>Signature: </a:t>
+            </a:r>
+            <a:r>
+              <a:rPr lang="en-US" sz="2000" dirty="0">
+                <a:highlight>
+                  <a:srgbClr val="000000"/>
+                </a:highlight>
+                <a:latin typeface="Consolas" panose="020B0609020204030204" pitchFamily="49" charset="0"/>
+              </a:rPr>
+              <a:t>set(&lt;variable&gt; &lt;value&gt;... CACHE &lt;type&gt; &lt;docstring&gt; [FORCE])</a:t>
+            </a:r>
+          </a:p>
+          <a:p>
+            <a:r>
+              <a:rPr lang="en-US" dirty="0">
+                <a:latin typeface="Consolas" panose="020B0609020204030204" pitchFamily="49" charset="0"/>
+              </a:rPr>
+              <a:t>CACHE </a:t>
+            </a:r>
+            <a:r>
+              <a:rPr lang="en-US" dirty="0"/>
+              <a:t>keyword argument specifies cache signature</a:t>
+            </a:r>
+          </a:p>
+          <a:p>
+            <a:r>
+              <a:rPr lang="en-US" dirty="0"/>
+              <a:t>Type specifies the type of data that will be stored in the variable.</a:t>
+            </a:r>
+          </a:p>
+          <a:p>
+            <a:pPr lvl="1"/>
+            <a:r>
+              <a:rPr lang="en-US" dirty="0"/>
+              <a:t>Possible values:</a:t>
+            </a:r>
+            <a:r>
+              <a:rPr lang="en-US" dirty="0">
+                <a:latin typeface="Consolas" panose="020B0609020204030204" pitchFamily="49" charset="0"/>
+              </a:rPr>
+              <a:t> BOOL, FILEPATH, PATH, STRING, INTERNAL</a:t>
+            </a:r>
+          </a:p>
+          <a:p>
+            <a:r>
+              <a:rPr lang="en-US" dirty="0"/>
+              <a:t>docstring is the comment that will be attached to the variable in the cache</a:t>
+            </a:r>
+          </a:p>
+          <a:p>
+            <a:r>
+              <a:rPr lang="en-US" dirty="0"/>
+              <a:t>If FORCE is given, the variable’s value will be overwritten.  Otherwise it will not be modified if it already exists</a:t>
+            </a:r>
+          </a:p>
+          <a:p>
+            <a:pPr lvl="1"/>
+            <a:r>
+              <a:rPr lang="en-US" dirty="0"/>
+              <a:t>Why is this?</a:t>
+            </a:r>
+          </a:p>
+          <a:p>
+            <a:endParaRPr lang="en-US" dirty="0">
+              <a:latin typeface="Consolas" panose="020B0609020204030204" pitchFamily="49" charset="0"/>
+            </a:endParaRPr>
+          </a:p>
+        </p:txBody>
+      </p:sp>
+    </p:spTree>
+    <p:extLst>
+      <p:ext uri="{BB962C8B-B14F-4D97-AF65-F5344CB8AC3E}">
+        <p14:creationId xmlns:p14="http://schemas.microsoft.com/office/powerpoint/2010/main" val="3970434297"/>
+      </p:ext>
+    </p:extLst>
+  </p:cSld>
+  <p:clrMapOvr>
+    <a:masterClrMapping/>
+  </p:clrMapOvr>
+</p:sld>
+</file>
+
+<file path=ppt/slides/slide13.xml><?xml version="1.0" encoding="utf-8"?>
+<p:sld xmlns:a="http://schemas.openxmlformats.org/drawingml/2006/main" xmlns:r="http://schemas.openxmlformats.org/officeDocument/2006/relationships" xmlns:p="http://schemas.openxmlformats.org/presentationml/2006/main">
+  <p:cSld>
+    <p:spTree>
+      <p:nvGrpSpPr>
+        <p:cNvPr id="1" name=""/>
+        <p:cNvGrpSpPr/>
+        <p:nvPr/>
+      </p:nvGrpSpPr>
+      <p:grpSpPr>
+        <a:xfrm>
+          <a:off x="0" y="0"/>
+          <a:ext cx="0" cy="0"/>
+          <a:chOff x="0" y="0"/>
+          <a:chExt cx="0" cy="0"/>
+        </a:xfrm>
+      </p:grpSpPr>
+      <p:sp>
+        <p:nvSpPr>
+          <p:cNvPr id="2" name="Title 1">
+            <a:extLst>
+              <a:ext uri="{FF2B5EF4-FFF2-40B4-BE49-F238E27FC236}">
+                <a16:creationId xmlns:a16="http://schemas.microsoft.com/office/drawing/2014/main" id="{317E8905-8AD5-4C2F-B7DB-4592C245C201}"/>
+              </a:ext>
+            </a:extLst>
+          </p:cNvPr>
+          <p:cNvSpPr>
+            <a:spLocks noGrp="1"/>
+          </p:cNvSpPr>
+          <p:nvPr>
+            <p:ph type="title"/>
+          </p:nvPr>
+        </p:nvSpPr>
+        <p:spPr/>
+        <p:txBody>
+          <a:bodyPr/>
+          <a:lstStyle/>
+          <a:p>
+            <a:r>
+              <a:rPr lang="en-US" dirty="0"/>
+              <a:t>Command Line Options</a:t>
+            </a:r>
+          </a:p>
+        </p:txBody>
+      </p:sp>
+      <p:sp>
+        <p:nvSpPr>
+          <p:cNvPr id="3" name="Content Placeholder 2">
+            <a:extLst>
+              <a:ext uri="{FF2B5EF4-FFF2-40B4-BE49-F238E27FC236}">
+                <a16:creationId xmlns:a16="http://schemas.microsoft.com/office/drawing/2014/main" id="{20D66013-A24F-4663-8232-2C2A0322B7A8}"/>
+              </a:ext>
+            </a:extLst>
+          </p:cNvPr>
+          <p:cNvSpPr>
+            <a:spLocks noGrp="1"/>
+          </p:cNvSpPr>
+          <p:nvPr>
+            <p:ph idx="1"/>
+          </p:nvPr>
+        </p:nvSpPr>
+        <p:spPr/>
+        <p:txBody>
+          <a:bodyPr/>
+          <a:lstStyle/>
+          <a:p>
+            <a:r>
+              <a:rPr lang="en-US" dirty="0"/>
+              <a:t>Cache variables can also be set on the command line using </a:t>
+            </a:r>
+            <a:r>
+              <a:rPr lang="en-US" dirty="0">
+                <a:highlight>
+                  <a:srgbClr val="000000"/>
+                </a:highlight>
+                <a:latin typeface="Consolas" panose="020B0609020204030204" pitchFamily="49" charset="0"/>
+              </a:rPr>
+              <a:t>–DMY_CACHE_VAR=&lt;value&gt;</a:t>
+            </a:r>
+          </a:p>
+          <a:p>
+            <a:r>
+              <a:rPr lang="en-US" dirty="0"/>
+              <a:t>Intention is for set(CACHE) to be used to initialize an option with a default value, and then the user can override it on the command line</a:t>
+            </a:r>
+          </a:p>
+          <a:p>
+            <a:r>
+              <a:rPr lang="en-US" dirty="0"/>
+              <a:t>However, sometimes scripts need to store data even though it isn’t a settable option.  This is what the INTERNAL type, which hides the variable from the user, is for</a:t>
+            </a:r>
+          </a:p>
+          <a:p>
+            <a:endParaRPr lang="en-US" dirty="0"/>
+          </a:p>
+        </p:txBody>
+      </p:sp>
+    </p:spTree>
+    <p:extLst>
+      <p:ext uri="{BB962C8B-B14F-4D97-AF65-F5344CB8AC3E}">
+        <p14:creationId xmlns:p14="http://schemas.microsoft.com/office/powerpoint/2010/main" val="1356219004"/>
+      </p:ext>
+    </p:extLst>
+  </p:cSld>
+  <p:clrMapOvr>
+    <a:masterClrMapping/>
+  </p:clrMapOvr>
+</p:sld>
+</file>
+
+<file path=ppt/slides/slide14.xml><?xml version="1.0" encoding="utf-8"?>
+<p:sld xmlns:a="http://schemas.openxmlformats.org/drawingml/2006/main" xmlns:r="http://schemas.openxmlformats.org/officeDocument/2006/relationships" xmlns:p="http://schemas.openxmlformats.org/presentationml/2006/main">
+  <p:cSld>
+    <p:spTree>
+      <p:nvGrpSpPr>
+        <p:cNvPr id="1" name=""/>
+        <p:cNvGrpSpPr/>
+        <p:nvPr/>
+      </p:nvGrpSpPr>
+      <p:grpSpPr>
+        <a:xfrm>
+          <a:off x="0" y="0"/>
+          <a:ext cx="0" cy="0"/>
+          <a:chOff x="0" y="0"/>
+          <a:chExt cx="0" cy="0"/>
+        </a:xfrm>
+      </p:grpSpPr>
+      <p:sp>
+        <p:nvSpPr>
+          <p:cNvPr id="2" name="Title 1">
+            <a:extLst>
+              <a:ext uri="{FF2B5EF4-FFF2-40B4-BE49-F238E27FC236}">
+                <a16:creationId xmlns:a16="http://schemas.microsoft.com/office/drawing/2014/main" id="{FFEDEB4D-1F8C-4956-9439-86169BC4066D}"/>
+              </a:ext>
+            </a:extLst>
+          </p:cNvPr>
+          <p:cNvSpPr>
+            <a:spLocks noGrp="1"/>
+          </p:cNvSpPr>
+          <p:nvPr>
+            <p:ph type="title"/>
+          </p:nvPr>
+        </p:nvSpPr>
+        <p:spPr/>
+        <p:txBody>
+          <a:bodyPr/>
+          <a:lstStyle/>
+          <a:p>
+            <a:r>
+              <a:rPr lang="en-US" dirty="0"/>
+              <a:t>Viewing Cache Variables</a:t>
+            </a:r>
+          </a:p>
+        </p:txBody>
+      </p:sp>
+      <p:sp>
+        <p:nvSpPr>
+          <p:cNvPr id="3" name="Content Placeholder 2">
+            <a:extLst>
+              <a:ext uri="{FF2B5EF4-FFF2-40B4-BE49-F238E27FC236}">
+                <a16:creationId xmlns:a16="http://schemas.microsoft.com/office/drawing/2014/main" id="{7F13293D-8F31-47C5-A938-818E46AAB199}"/>
+              </a:ext>
+            </a:extLst>
+          </p:cNvPr>
+          <p:cNvSpPr>
+            <a:spLocks noGrp="1"/>
+          </p:cNvSpPr>
+          <p:nvPr>
+            <p:ph idx="1"/>
+          </p:nvPr>
+        </p:nvSpPr>
+        <p:spPr>
+          <a:xfrm>
+            <a:off x="685801" y="1799112"/>
+            <a:ext cx="10131425" cy="4626401"/>
+          </a:xfrm>
+        </p:spPr>
+        <p:txBody>
+          <a:bodyPr>
+            <a:normAutofit/>
+          </a:bodyPr>
+          <a:lstStyle/>
+          <a:p>
+            <a:r>
+              <a:rPr lang="en-US" dirty="0"/>
+              <a:t>Cache variables can be viewed and edited by:</a:t>
+            </a:r>
+          </a:p>
+          <a:p>
+            <a:pPr lvl="1"/>
+            <a:r>
+              <a:rPr lang="en-US" dirty="0"/>
+              <a:t>Editing CMakeCache.txt</a:t>
+            </a:r>
+          </a:p>
+          <a:p>
+            <a:pPr lvl="1"/>
+            <a:r>
+              <a:rPr lang="en-US" dirty="0"/>
+              <a:t>Using the </a:t>
+            </a:r>
+            <a:r>
+              <a:rPr lang="en-US" dirty="0" err="1"/>
+              <a:t>ccmake</a:t>
+            </a:r>
+            <a:r>
+              <a:rPr lang="en-US" dirty="0"/>
+              <a:t> tool</a:t>
+            </a:r>
+          </a:p>
+          <a:p>
+            <a:pPr lvl="1"/>
+            <a:r>
+              <a:rPr lang="en-US" dirty="0"/>
+              <a:t>Using the </a:t>
+            </a:r>
+            <a:r>
+              <a:rPr lang="en-US" dirty="0" err="1"/>
+              <a:t>cmake-gui</a:t>
+            </a:r>
+            <a:r>
+              <a:rPr lang="en-US" dirty="0"/>
+              <a:t> tool</a:t>
+            </a:r>
+          </a:p>
+          <a:p>
+            <a:r>
+              <a:rPr lang="en-US" dirty="0"/>
+              <a:t>The intention was for these to provide a user-friendly interface for configuring CMake projects</a:t>
+            </a:r>
+          </a:p>
+          <a:p>
+            <a:r>
+              <a:rPr lang="en-US" dirty="0"/>
+              <a:t>However, 95% of users don’t know these exist, so developers don’t usually spend time making them clean and usable, so people rarely use them</a:t>
+            </a:r>
+          </a:p>
+          <a:p>
+            <a:r>
+              <a:rPr lang="en-US" dirty="0"/>
+              <a:t>Bit of a chicken-and-egg problem…</a:t>
+            </a:r>
+          </a:p>
+        </p:txBody>
+      </p:sp>
+    </p:spTree>
+    <p:extLst>
+      <p:ext uri="{BB962C8B-B14F-4D97-AF65-F5344CB8AC3E}">
+        <p14:creationId xmlns:p14="http://schemas.microsoft.com/office/powerpoint/2010/main" val="2843450251"/>
+      </p:ext>
+    </p:extLst>
+  </p:cSld>
+  <p:clrMapOvr>
+    <a:masterClrMapping/>
+  </p:clrMapOvr>
+</p:sld>
+</file>
+
+<file path=ppt/slides/slide15.xml><?xml version="1.0" encoding="utf-8"?>
+<p:sld xmlns:a="http://schemas.openxmlformats.org/drawingml/2006/main" xmlns:r="http://schemas.openxmlformats.org/officeDocument/2006/relationships" xmlns:p="http://schemas.openxmlformats.org/presentationml/2006/main">
+  <p:cSld>
+    <p:spTree>
+      <p:nvGrpSpPr>
+        <p:cNvPr id="1" name=""/>
+        <p:cNvGrpSpPr/>
+        <p:nvPr/>
+      </p:nvGrpSpPr>
+      <p:grpSpPr>
+        <a:xfrm>
+          <a:off x="0" y="0"/>
+          <a:ext cx="0" cy="0"/>
+          <a:chOff x="0" y="0"/>
+          <a:chExt cx="0" cy="0"/>
+        </a:xfrm>
+      </p:grpSpPr>
+      <p:sp>
+        <p:nvSpPr>
+          <p:cNvPr id="2" name="Title 1">
+            <a:extLst>
+              <a:ext uri="{FF2B5EF4-FFF2-40B4-BE49-F238E27FC236}">
                 <a16:creationId xmlns:a16="http://schemas.microsoft.com/office/drawing/2014/main" id="{B48DB764-947E-4540-9E5F-EA823B64CD61}"/>
               </a:ext>
             </a:extLst>
@@ -6090,7 +7243,7 @@
 </p:sld>
 </file>
 
-<file path=ppt/slides/slide11.xml><?xml version="1.0" encoding="utf-8"?>
+<file path=ppt/slides/slide16.xml><?xml version="1.0" encoding="utf-8"?>
 <p:sld xmlns:a="http://schemas.openxmlformats.org/drawingml/2006/main" xmlns:r="http://schemas.openxmlformats.org/officeDocument/2006/relationships" xmlns:p="http://schemas.openxmlformats.org/presentationml/2006/main">
   <p:cSld>
     <p:spTree>
@@ -6213,7 +7366,7 @@
 </p:sld>
 </file>
 
-<file path=ppt/slides/slide12.xml><?xml version="1.0" encoding="utf-8"?>
+<file path=ppt/slides/slide17.xml><?xml version="1.0" encoding="utf-8"?>
 <p:sld xmlns:a="http://schemas.openxmlformats.org/drawingml/2006/main" xmlns:r="http://schemas.openxmlformats.org/officeDocument/2006/relationships" xmlns:p="http://schemas.openxmlformats.org/presentationml/2006/main">
   <p:cSld>
     <p:spTree>
@@ -6336,7 +7489,7 @@
 </p:sld>
 </file>
 
-<file path=ppt/slides/slide13.xml><?xml version="1.0" encoding="utf-8"?>
+<file path=ppt/slides/slide18.xml><?xml version="1.0" encoding="utf-8"?>
 <p:sld xmlns:a="http://schemas.openxmlformats.org/drawingml/2006/main" xmlns:r="http://schemas.openxmlformats.org/officeDocument/2006/relationships" xmlns:p="http://schemas.openxmlformats.org/presentationml/2006/main">
   <p:cSld>
     <p:spTree>
@@ -6448,7 +7601,7 @@
           <p:nvPr>
             <p:extLst>
               <p:ext uri="{D42A27DB-BD31-4B8C-83A1-F6EECF244321}">
-                <p14:modId xmlns:p14="http://schemas.microsoft.com/office/powerpoint/2010/main" val="2684750520"/>
+                <p14:modId xmlns:p14="http://schemas.microsoft.com/office/powerpoint/2010/main" val="2952122000"/>
               </p:ext>
             </p:extLst>
           </p:nvPr>
@@ -6704,7 +7857,7 @@
                     <a:p>
                       <a:r>
                         <a:rPr lang="en-US" dirty="0"/>
-                        <a:t>If the cache variable had already been created, then it stays out of scope.  However, if the cache variable did not already exist, the local variable is deleted and the new cache variable is put into scope</a:t>
+                        <a:t>If the cache variable was already in the cache, then the cache variable stays out of scope.  However, if the cache variable did not exist, the local variable is deleted and the new cache variable is put into scope</a:t>
                       </a:r>
                     </a:p>
                   </a:txBody>
@@ -6733,7 +7886,7 @@
 </p:sld>
 </file>
 
-<file path=ppt/slides/slide14.xml><?xml version="1.0" encoding="utf-8"?>
+<file path=ppt/slides/slide19.xml><?xml version="1.0" encoding="utf-8"?>
 <p:sld xmlns:a="http://schemas.openxmlformats.org/drawingml/2006/main" xmlns:r="http://schemas.openxmlformats.org/officeDocument/2006/relationships" xmlns:p="http://schemas.openxmlformats.org/presentationml/2006/main">
   <p:cSld>
     <p:spTree>
@@ -6982,7 +8135,133 @@
 </p:sld>
 </file>
 
-<file path=ppt/slides/slide15.xml><?xml version="1.0" encoding="utf-8"?>
+<file path=ppt/slides/slide2.xml><?xml version="1.0" encoding="utf-8"?>
+<p:sld xmlns:a="http://schemas.openxmlformats.org/drawingml/2006/main" xmlns:r="http://schemas.openxmlformats.org/officeDocument/2006/relationships" xmlns:p="http://schemas.openxmlformats.org/presentationml/2006/main">
+  <p:cSld>
+    <p:spTree>
+      <p:nvGrpSpPr>
+        <p:cNvPr id="1" name=""/>
+        <p:cNvGrpSpPr/>
+        <p:nvPr/>
+      </p:nvGrpSpPr>
+      <p:grpSpPr>
+        <a:xfrm>
+          <a:off x="0" y="0"/>
+          <a:ext cx="0" cy="0"/>
+          <a:chOff x="0" y="0"/>
+          <a:chExt cx="0" cy="0"/>
+        </a:xfrm>
+      </p:grpSpPr>
+      <p:sp>
+        <p:nvSpPr>
+          <p:cNvPr id="2" name="Title 1">
+            <a:extLst>
+              <a:ext uri="{FF2B5EF4-FFF2-40B4-BE49-F238E27FC236}">
+                <a16:creationId xmlns:a16="http://schemas.microsoft.com/office/drawing/2014/main" id="{BF631BF0-9B3C-4402-B0E6-B14A562BC2B7}"/>
+              </a:ext>
+            </a:extLst>
+          </p:cNvPr>
+          <p:cNvSpPr>
+            <a:spLocks noGrp="1"/>
+          </p:cNvSpPr>
+          <p:nvPr>
+            <p:ph type="title"/>
+          </p:nvPr>
+        </p:nvSpPr>
+        <p:spPr/>
+        <p:txBody>
+          <a:bodyPr/>
+          <a:lstStyle/>
+          <a:p>
+            <a:r>
+              <a:rPr lang="en-US" dirty="0"/>
+              <a:t>Intro: A Short History of CMake</a:t>
+            </a:r>
+          </a:p>
+        </p:txBody>
+      </p:sp>
+      <p:sp>
+        <p:nvSpPr>
+          <p:cNvPr id="3" name="Content Placeholder 2">
+            <a:extLst>
+              <a:ext uri="{FF2B5EF4-FFF2-40B4-BE49-F238E27FC236}">
+                <a16:creationId xmlns:a16="http://schemas.microsoft.com/office/drawing/2014/main" id="{13C40EA0-F33A-4964-9C62-8A82FA4AA384}"/>
+              </a:ext>
+            </a:extLst>
+          </p:cNvPr>
+          <p:cNvSpPr>
+            <a:spLocks noGrp="1"/>
+          </p:cNvSpPr>
+          <p:nvPr>
+            <p:ph idx="1"/>
+          </p:nvPr>
+        </p:nvSpPr>
+        <p:spPr>
+          <a:xfrm>
+            <a:off x="685801" y="1905991"/>
+            <a:ext cx="11207337" cy="4667002"/>
+          </a:xfrm>
+        </p:spPr>
+        <p:txBody>
+          <a:bodyPr>
+            <a:normAutofit/>
+          </a:bodyPr>
+          <a:lstStyle/>
+          <a:p>
+            <a:r>
+              <a:rPr lang="en-US" sz="2800" dirty="0"/>
+              <a:t>2000: </a:t>
+            </a:r>
+            <a:r>
+              <a:rPr lang="en-US" sz="2800" dirty="0" err="1"/>
+              <a:t>Kitware</a:t>
+            </a:r>
+            <a:r>
+              <a:rPr lang="en-US" sz="2800" dirty="0"/>
+              <a:t> contracted to develop a new build system for a bioinformatics program called ITK: a Cross-platform Make</a:t>
+            </a:r>
+          </a:p>
+          <a:p>
+            <a:r>
+              <a:rPr lang="en-US" sz="2800" dirty="0"/>
+              <a:t>2006: Massive KDE project (Linux desktop environment) switches its entire build system to CMake and gives it rave reviews.  </a:t>
+            </a:r>
+          </a:p>
+          <a:p>
+            <a:r>
+              <a:rPr lang="en-US" sz="2800" dirty="0"/>
+              <a:t>2014: CMake 3.0 is released, introducing many of the features we use as standard today.</a:t>
+            </a:r>
+          </a:p>
+          <a:p>
+            <a:r>
+              <a:rPr lang="en-US" sz="2800" dirty="0"/>
+              <a:t>More good info: </a:t>
+            </a:r>
+            <a:r>
+              <a:rPr lang="en-US" sz="2800" dirty="0">
+                <a:hlinkClick r:id="rId3"/>
+              </a:rPr>
+              <a:t>https://www.aosabook.org/en/cmake.html</a:t>
+            </a:r>
+            <a:endParaRPr lang="en-US" sz="2800" dirty="0"/>
+          </a:p>
+        </p:txBody>
+      </p:sp>
+    </p:spTree>
+    <p:extLst>
+      <p:ext uri="{BB962C8B-B14F-4D97-AF65-F5344CB8AC3E}">
+        <p14:creationId xmlns:p14="http://schemas.microsoft.com/office/powerpoint/2010/main" val="68902798"/>
+      </p:ext>
+    </p:extLst>
+  </p:cSld>
+  <p:clrMapOvr>
+    <a:masterClrMapping/>
+  </p:clrMapOvr>
+</p:sld>
+</file>
+
+<file path=ppt/slides/slide20.xml><?xml version="1.0" encoding="utf-8"?>
 <p:sld xmlns:a="http://schemas.openxmlformats.org/drawingml/2006/main" xmlns:r="http://schemas.openxmlformats.org/officeDocument/2006/relationships" xmlns:p="http://schemas.openxmlformats.org/presentationml/2006/main">
   <p:cSld>
     <p:spTree>
@@ -7220,7 +8499,7 @@
 </p:sld>
 </file>
 
-<file path=ppt/slides/slide16.xml><?xml version="1.0" encoding="utf-8"?>
+<file path=ppt/slides/slide21.xml><?xml version="1.0" encoding="utf-8"?>
 <p:sld xmlns:a="http://schemas.openxmlformats.org/drawingml/2006/main" xmlns:r="http://schemas.openxmlformats.org/officeDocument/2006/relationships" xmlns:p="http://schemas.openxmlformats.org/presentationml/2006/main">
   <p:cSld>
     <p:spTree>
@@ -7507,168 +8786,6 @@
 </p:sld>
 </file>
 
-<file path=ppt/slides/slide2.xml><?xml version="1.0" encoding="utf-8"?>
-<p:sld xmlns:a="http://schemas.openxmlformats.org/drawingml/2006/main" xmlns:r="http://schemas.openxmlformats.org/officeDocument/2006/relationships" xmlns:p="http://schemas.openxmlformats.org/presentationml/2006/main">
-  <p:cSld>
-    <p:spTree>
-      <p:nvGrpSpPr>
-        <p:cNvPr id="1" name=""/>
-        <p:cNvGrpSpPr/>
-        <p:nvPr/>
-      </p:nvGrpSpPr>
-      <p:grpSpPr>
-        <a:xfrm>
-          <a:off x="0" y="0"/>
-          <a:ext cx="0" cy="0"/>
-          <a:chOff x="0" y="0"/>
-          <a:chExt cx="0" cy="0"/>
-        </a:xfrm>
-      </p:grpSpPr>
-      <p:sp>
-        <p:nvSpPr>
-          <p:cNvPr id="2" name="Title 1">
-            <a:extLst>
-              <a:ext uri="{FF2B5EF4-FFF2-40B4-BE49-F238E27FC236}">
-                <a16:creationId xmlns:a16="http://schemas.microsoft.com/office/drawing/2014/main" id="{BF631BF0-9B3C-4402-B0E6-B14A562BC2B7}"/>
-              </a:ext>
-            </a:extLst>
-          </p:cNvPr>
-          <p:cNvSpPr>
-            <a:spLocks noGrp="1"/>
-          </p:cNvSpPr>
-          <p:nvPr>
-            <p:ph type="title"/>
-          </p:nvPr>
-        </p:nvSpPr>
-        <p:spPr/>
-        <p:txBody>
-          <a:bodyPr/>
-          <a:lstStyle/>
-          <a:p>
-            <a:r>
-              <a:rPr lang="en-US" dirty="0"/>
-              <a:t>Intro: A Short History of CMake</a:t>
-            </a:r>
-          </a:p>
-        </p:txBody>
-      </p:sp>
-      <p:sp>
-        <p:nvSpPr>
-          <p:cNvPr id="3" name="Content Placeholder 2">
-            <a:extLst>
-              <a:ext uri="{FF2B5EF4-FFF2-40B4-BE49-F238E27FC236}">
-                <a16:creationId xmlns:a16="http://schemas.microsoft.com/office/drawing/2014/main" id="{13C40EA0-F33A-4964-9C62-8A82FA4AA384}"/>
-              </a:ext>
-            </a:extLst>
-          </p:cNvPr>
-          <p:cNvSpPr>
-            <a:spLocks noGrp="1"/>
-          </p:cNvSpPr>
-          <p:nvPr>
-            <p:ph idx="1"/>
-          </p:nvPr>
-        </p:nvSpPr>
-        <p:spPr>
-          <a:xfrm>
-            <a:off x="685801" y="1905991"/>
-            <a:ext cx="11207337" cy="4667002"/>
-          </a:xfrm>
-        </p:spPr>
-        <p:txBody>
-          <a:bodyPr>
-            <a:normAutofit fontScale="92500" lnSpcReduction="10000"/>
-          </a:bodyPr>
-          <a:lstStyle/>
-          <a:p>
-            <a:r>
-              <a:rPr lang="en-US" dirty="0"/>
-              <a:t>2000: </a:t>
-            </a:r>
-            <a:r>
-              <a:rPr lang="en-US" dirty="0" err="1"/>
-              <a:t>Kitware</a:t>
-            </a:r>
-            <a:r>
-              <a:rPr lang="en-US" dirty="0"/>
-              <a:t> contracted to develop a new build system for a bioinformatics program called ITK: a Cross-platform Make</a:t>
-            </a:r>
-          </a:p>
-          <a:p>
-            <a:pPr lvl="1"/>
-            <a:r>
-              <a:rPr lang="en-US" dirty="0"/>
-              <a:t>Had to be able to read in a buildscript in a single format and generate </a:t>
-            </a:r>
-            <a:r>
-              <a:rPr lang="en-US" dirty="0" err="1"/>
-              <a:t>Makefiles</a:t>
-            </a:r>
-            <a:r>
-              <a:rPr lang="en-US" dirty="0"/>
-              <a:t> for Linux and Visual Studio project files for Windows</a:t>
-            </a:r>
-          </a:p>
-          <a:p>
-            <a:pPr lvl="1"/>
-            <a:r>
-              <a:rPr lang="en-US" dirty="0"/>
-              <a:t>Needed to support complex configurations, 3</a:t>
-            </a:r>
-            <a:r>
-              <a:rPr lang="en-US" baseline="30000" dirty="0"/>
-              <a:t>rd</a:t>
-            </a:r>
-            <a:r>
-              <a:rPr lang="en-US" dirty="0"/>
-              <a:t> party libraries, and custom commands which generates source files</a:t>
-            </a:r>
-          </a:p>
-          <a:p>
-            <a:r>
-              <a:rPr lang="en-US" dirty="0"/>
-              <a:t>The CMake of the early 00s was very different from what we know today.  It used an almost completely different set of commands, most of which operated at the global scope</a:t>
-            </a:r>
-          </a:p>
-          <a:p>
-            <a:r>
-              <a:rPr lang="en-US" dirty="0"/>
-              <a:t>2006: KDE switches its entire build system to CMake.  Many other open-source projects begin to follow suit over the next few years.</a:t>
-            </a:r>
-          </a:p>
-          <a:p>
-            <a:r>
-              <a:rPr lang="en-US" dirty="0"/>
-              <a:t>2014: CMake 3.0 is released, introducing many of the features we use as standard today.</a:t>
-            </a:r>
-          </a:p>
-          <a:p>
-            <a:r>
-              <a:rPr lang="en-US" dirty="0"/>
-              <a:t>More good info: </a:t>
-            </a:r>
-            <a:r>
-              <a:rPr lang="en-US" dirty="0">
-                <a:hlinkClick r:id="rId2"/>
-              </a:rPr>
-              <a:t>https://www.aosabook.org/en/cmake.html</a:t>
-            </a:r>
-            <a:endParaRPr lang="en-US" dirty="0"/>
-          </a:p>
-        </p:txBody>
-      </p:sp>
-    </p:spTree>
-    <p:extLst>
-      <p:ext uri="{BB962C8B-B14F-4D97-AF65-F5344CB8AC3E}">
-        <p14:creationId xmlns:p14="http://schemas.microsoft.com/office/powerpoint/2010/main" val="68902798"/>
-      </p:ext>
-    </p:extLst>
-  </p:cSld>
-  <p:clrMapOvr>
-    <a:masterClrMapping/>
-  </p:clrMapOvr>
-</p:sld>
-</file>
-
 <file path=ppt/slides/slide3.xml><?xml version="1.0" encoding="utf-8"?>
 <p:sld xmlns:a="http://schemas.openxmlformats.org/drawingml/2006/main" xmlns:r="http://schemas.openxmlformats.org/officeDocument/2006/relationships" xmlns:p="http://schemas.openxmlformats.org/presentationml/2006/main">
   <p:cSld>
@@ -7818,7 +8935,9 @@
         </p:nvSpPr>
         <p:spPr/>
         <p:txBody>
-          <a:bodyPr/>
+          <a:bodyPr>
+            <a:normAutofit/>
+          </a:bodyPr>
           <a:lstStyle/>
           <a:p>
             <a:r>
@@ -7830,11 +8949,75 @@
             <a:pPr lvl="1"/>
             <a:r>
               <a:rPr lang="en-US" dirty="0"/>
+              <a:t>Executable</a:t>
+            </a:r>
+          </a:p>
+          <a:p>
+            <a:pPr lvl="1"/>
+            <a:r>
+              <a:rPr lang="en-US" dirty="0"/>
               <a:t>Static library</a:t>
             </a:r>
           </a:p>
-        </p:txBody>
-      </p:sp>
+          <a:p>
+            <a:pPr lvl="1"/>
+            <a:r>
+              <a:rPr lang="en-US" dirty="0"/>
+              <a:t>Shared library</a:t>
+            </a:r>
+          </a:p>
+          <a:p>
+            <a:pPr lvl="1"/>
+            <a:r>
+              <a:rPr lang="en-US" dirty="0"/>
+              <a:t>Object library</a:t>
+            </a:r>
+          </a:p>
+          <a:p>
+            <a:pPr lvl="1"/>
+            <a:r>
+              <a:rPr lang="en-US" dirty="0"/>
+              <a:t>Custom target (we’ll talk about these in session 4)</a:t>
+            </a:r>
+          </a:p>
+          <a:p>
+            <a:r>
+              <a:rPr lang="en-US" dirty="0"/>
+              <a:t>The entire purpose of a build system, its reason for existence, is to create targets.</a:t>
+            </a:r>
+          </a:p>
+        </p:txBody>
+      </p:sp>
+      <p:pic>
+        <p:nvPicPr>
+          <p:cNvPr id="4" name="Picture 3">
+            <a:extLst>
+              <a:ext uri="{FF2B5EF4-FFF2-40B4-BE49-F238E27FC236}">
+                <a16:creationId xmlns:a16="http://schemas.microsoft.com/office/drawing/2014/main" id="{5D6995E4-D5C8-489D-9CD5-11564B61ECAD}"/>
+              </a:ext>
+            </a:extLst>
+          </p:cNvPr>
+          <p:cNvPicPr>
+            <a:picLocks noChangeAspect="1"/>
+          </p:cNvPicPr>
+          <p:nvPr/>
+        </p:nvPicPr>
+        <p:blipFill>
+          <a:blip r:embed="rId2"/>
+          <a:stretch>
+            <a:fillRect/>
+          </a:stretch>
+        </p:blipFill>
+        <p:spPr>
+          <a:xfrm>
+            <a:off x="8031879" y="2266798"/>
+            <a:ext cx="3724795" cy="1086002"/>
+          </a:xfrm>
+          <a:prstGeom prst="rect">
+            <a:avLst/>
+          </a:prstGeom>
+        </p:spPr>
+      </p:pic>
     </p:spTree>
     <p:extLst>
       <p:ext uri="{BB962C8B-B14F-4D97-AF65-F5344CB8AC3E}">
@@ -7870,7 +9053,7 @@
           <p:cNvPr id="2" name="Title 1">
             <a:extLst>
               <a:ext uri="{FF2B5EF4-FFF2-40B4-BE49-F238E27FC236}">
-                <a16:creationId xmlns:a16="http://schemas.microsoft.com/office/drawing/2014/main" id="{E0A529B2-0B54-4C1F-8CAB-08483B972F13}"/>
+                <a16:creationId xmlns:a16="http://schemas.microsoft.com/office/drawing/2014/main" id="{B86E0250-EF3A-4762-B2E4-CD8B82091B34}"/>
               </a:ext>
             </a:extLst>
           </p:cNvPr>
@@ -7888,17 +9071,17 @@
           <a:p>
             <a:r>
               <a:rPr lang="en-US" dirty="0"/>
-              <a:t>Part 2</a:t>
-            </a:r>
-          </a:p>
-        </p:txBody>
-      </p:sp>
-      <p:sp>
-        <p:nvSpPr>
-          <p:cNvPr id="3" name="Text Placeholder 2">
+              <a:t>CMake build systems are structured around targets</a:t>
+            </a:r>
+          </a:p>
+        </p:txBody>
+      </p:sp>
+      <p:sp>
+        <p:nvSpPr>
+          <p:cNvPr id="3" name="Content Placeholder 2">
             <a:extLst>
               <a:ext uri="{FF2B5EF4-FFF2-40B4-BE49-F238E27FC236}">
-                <a16:creationId xmlns:a16="http://schemas.microsoft.com/office/drawing/2014/main" id="{45B44E9B-E012-42F2-937C-6565BA8EDAF4}"/>
+                <a16:creationId xmlns:a16="http://schemas.microsoft.com/office/drawing/2014/main" id="{FAB45F3F-8B10-4772-8893-B4E790B99F80}"/>
               </a:ext>
             </a:extLst>
           </p:cNvPr>
@@ -7906,25 +9089,230 @@
             <a:spLocks noGrp="1"/>
           </p:cNvSpPr>
           <p:nvPr>
-            <p:ph type="body" idx="1"/>
-          </p:nvPr>
-        </p:nvSpPr>
-        <p:spPr/>
+            <p:ph idx="1"/>
+          </p:nvPr>
+        </p:nvSpPr>
+        <p:spPr>
+          <a:xfrm>
+            <a:off x="685801" y="1799113"/>
+            <a:ext cx="8375023" cy="3992088"/>
+          </a:xfrm>
+        </p:spPr>
         <p:txBody>
           <a:bodyPr/>
           <a:lstStyle/>
           <a:p>
             <a:r>
               <a:rPr lang="en-US" dirty="0"/>
-              <a:t>Build Types and Compile Flags</a:t>
-            </a:r>
-          </a:p>
-        </p:txBody>
-      </p:sp>
+              <a:t>All code files are compiled as part of one target or another</a:t>
+            </a:r>
+          </a:p>
+          <a:p>
+            <a:r>
+              <a:rPr lang="en-US" dirty="0"/>
+              <a:t>Dependencies are expressed in terms of targets</a:t>
+            </a:r>
+          </a:p>
+          <a:p>
+            <a:pPr lvl="1"/>
+            <a:r>
+              <a:rPr lang="en-US" dirty="0"/>
+              <a:t>“Dependency” in CMake means “build X before Y”</a:t>
+            </a:r>
+          </a:p>
+          <a:p>
+            <a:r>
+              <a:rPr lang="en-US" dirty="0"/>
+              <a:t>Dependencies are automatically created between an executable and its libraries</a:t>
+            </a:r>
+          </a:p>
+        </p:txBody>
+      </p:sp>
+      <p:sp>
+        <p:nvSpPr>
+          <p:cNvPr id="4" name="Oval 3">
+            <a:extLst>
+              <a:ext uri="{FF2B5EF4-FFF2-40B4-BE49-F238E27FC236}">
+                <a16:creationId xmlns:a16="http://schemas.microsoft.com/office/drawing/2014/main" id="{2F6E5F2B-890A-4C41-B47C-3231253A7C95}"/>
+              </a:ext>
+            </a:extLst>
+          </p:cNvPr>
+          <p:cNvSpPr/>
+          <p:nvPr/>
+        </p:nvSpPr>
+        <p:spPr>
+          <a:xfrm>
+            <a:off x="9060824" y="1957418"/>
+            <a:ext cx="2821578" cy="740229"/>
+          </a:xfrm>
+          <a:prstGeom prst="ellipse">
+            <a:avLst/>
+          </a:prstGeom>
+          <a:solidFill>
+            <a:schemeClr val="accent6">
+              <a:lumMod val="40000"/>
+              <a:lumOff val="60000"/>
+            </a:schemeClr>
+          </a:solidFill>
+        </p:spPr>
+        <p:style>
+          <a:lnRef idx="2">
+            <a:schemeClr val="accent1">
+              <a:shade val="50000"/>
+            </a:schemeClr>
+          </a:lnRef>
+          <a:fillRef idx="1">
+            <a:schemeClr val="accent1"/>
+          </a:fillRef>
+          <a:effectRef idx="0">
+            <a:schemeClr val="accent1"/>
+          </a:effectRef>
+          <a:fontRef idx="minor">
+            <a:schemeClr val="lt1"/>
+          </a:fontRef>
+        </p:style>
+        <p:txBody>
+          <a:bodyPr rtlCol="0" anchor="ctr"/>
+          <a:lstStyle/>
+          <a:p>
+            <a:pPr algn="ctr"/>
+            <a:r>
+              <a:rPr lang="en-US" sz="1600" dirty="0" err="1">
+                <a:solidFill>
+                  <a:schemeClr val="bg1"/>
+                </a:solidFill>
+                <a:latin typeface="Consolas" panose="020B0609020204030204" pitchFamily="49" charset="0"/>
+              </a:rPr>
+              <a:t>myprogram</a:t>
+            </a:r>
+            <a:endParaRPr lang="en-US" sz="1600" dirty="0">
+              <a:solidFill>
+                <a:schemeClr val="bg1"/>
+              </a:solidFill>
+              <a:latin typeface="Consolas" panose="020B0609020204030204" pitchFamily="49" charset="0"/>
+            </a:endParaRPr>
+          </a:p>
+        </p:txBody>
+      </p:sp>
+      <p:sp>
+        <p:nvSpPr>
+          <p:cNvPr id="5" name="Oval 4">
+            <a:extLst>
+              <a:ext uri="{FF2B5EF4-FFF2-40B4-BE49-F238E27FC236}">
+                <a16:creationId xmlns:a16="http://schemas.microsoft.com/office/drawing/2014/main" id="{9484D23D-4F9B-4F93-B80E-EE537E906FD3}"/>
+              </a:ext>
+            </a:extLst>
+          </p:cNvPr>
+          <p:cNvSpPr/>
+          <p:nvPr/>
+        </p:nvSpPr>
+        <p:spPr>
+          <a:xfrm>
+            <a:off x="8221268" y="4500994"/>
+            <a:ext cx="2595958" cy="740229"/>
+          </a:xfrm>
+          <a:prstGeom prst="ellipse">
+            <a:avLst/>
+          </a:prstGeom>
+          <a:solidFill>
+            <a:schemeClr val="accent4">
+              <a:lumMod val="40000"/>
+              <a:lumOff val="60000"/>
+            </a:schemeClr>
+          </a:solidFill>
+        </p:spPr>
+        <p:style>
+          <a:lnRef idx="2">
+            <a:schemeClr val="accent1">
+              <a:shade val="50000"/>
+            </a:schemeClr>
+          </a:lnRef>
+          <a:fillRef idx="1">
+            <a:schemeClr val="accent1"/>
+          </a:fillRef>
+          <a:effectRef idx="0">
+            <a:schemeClr val="accent1"/>
+          </a:effectRef>
+          <a:fontRef idx="minor">
+            <a:schemeClr val="lt1"/>
+          </a:fontRef>
+        </p:style>
+        <p:txBody>
+          <a:bodyPr rtlCol="0" anchor="ctr"/>
+          <a:lstStyle/>
+          <a:p>
+            <a:pPr algn="ctr"/>
+            <a:r>
+              <a:rPr lang="en-US" sz="1600" dirty="0" err="1">
+                <a:solidFill>
+                  <a:schemeClr val="bg1"/>
+                </a:solidFill>
+                <a:latin typeface="Consolas" panose="020B0609020204030204" pitchFamily="49" charset="0"/>
+              </a:rPr>
+              <a:t>libmylibrary.a</a:t>
+            </a:r>
+            <a:endParaRPr lang="en-US" sz="1600" dirty="0">
+              <a:solidFill>
+                <a:schemeClr val="bg1"/>
+              </a:solidFill>
+              <a:latin typeface="Consolas" panose="020B0609020204030204" pitchFamily="49" charset="0"/>
+            </a:endParaRPr>
+          </a:p>
+        </p:txBody>
+      </p:sp>
+      <p:cxnSp>
+        <p:nvCxnSpPr>
+          <p:cNvPr id="6" name="Straight Arrow Connector 5">
+            <a:extLst>
+              <a:ext uri="{FF2B5EF4-FFF2-40B4-BE49-F238E27FC236}">
+                <a16:creationId xmlns:a16="http://schemas.microsoft.com/office/drawing/2014/main" id="{87599821-987E-4784-A87C-E641CF0F477D}"/>
+              </a:ext>
+            </a:extLst>
+          </p:cNvPr>
+          <p:cNvCxnSpPr>
+            <a:cxnSpLocks/>
+            <a:stCxn id="5" idx="0"/>
+            <a:endCxn id="4" idx="4"/>
+          </p:cNvCxnSpPr>
+          <p:nvPr/>
+        </p:nvCxnSpPr>
+        <p:spPr>
+          <a:xfrm flipV="1">
+            <a:off x="9519247" y="2697647"/>
+            <a:ext cx="952366" cy="1803347"/>
+          </a:xfrm>
+          <a:prstGeom prst="straightConnector1">
+            <a:avLst/>
+          </a:prstGeom>
+          <a:ln w="76200">
+            <a:solidFill>
+              <a:schemeClr val="tx1">
+                <a:lumMod val="85000"/>
+                <a:lumOff val="15000"/>
+              </a:schemeClr>
+            </a:solidFill>
+            <a:tailEnd type="triangle"/>
+          </a:ln>
+        </p:spPr>
+        <p:style>
+          <a:lnRef idx="1">
+            <a:schemeClr val="accent1"/>
+          </a:lnRef>
+          <a:fillRef idx="0">
+            <a:schemeClr val="accent1"/>
+          </a:fillRef>
+          <a:effectRef idx="0">
+            <a:schemeClr val="accent1"/>
+          </a:effectRef>
+          <a:fontRef idx="minor">
+            <a:schemeClr val="tx1"/>
+          </a:fontRef>
+        </p:style>
+      </p:cxnSp>
     </p:spTree>
     <p:extLst>
       <p:ext uri="{BB962C8B-B14F-4D97-AF65-F5344CB8AC3E}">
-        <p14:creationId xmlns:p14="http://schemas.microsoft.com/office/powerpoint/2010/main" val="1076355408"/>
+        <p14:creationId xmlns:p14="http://schemas.microsoft.com/office/powerpoint/2010/main" val="3789785172"/>
       </p:ext>
     </p:extLst>
   </p:cSld>
@@ -7956,7 +9344,7 @@
           <p:cNvPr id="2" name="Title 1">
             <a:extLst>
               <a:ext uri="{FF2B5EF4-FFF2-40B4-BE49-F238E27FC236}">
-                <a16:creationId xmlns:a16="http://schemas.microsoft.com/office/drawing/2014/main" id="{55868575-3DCF-4655-BAF9-6169FA49734C}"/>
+                <a16:creationId xmlns:a16="http://schemas.microsoft.com/office/drawing/2014/main" id="{8EA3E59D-09D9-480C-8819-5630EB7B8637}"/>
               </a:ext>
             </a:extLst>
           </p:cNvPr>
@@ -7974,7 +9362,7 @@
           <a:p>
             <a:r>
               <a:rPr lang="en-US" dirty="0"/>
-              <a:t>The Weirdness that is Cache Variables</a:t>
+              <a:t>Executable targets</a:t>
             </a:r>
           </a:p>
         </p:txBody>
@@ -7984,7 +9372,7 @@
           <p:cNvPr id="3" name="Content Placeholder 2">
             <a:extLst>
               <a:ext uri="{FF2B5EF4-FFF2-40B4-BE49-F238E27FC236}">
-                <a16:creationId xmlns:a16="http://schemas.microsoft.com/office/drawing/2014/main" id="{7625972D-D6FB-410F-9599-57DFF0E01E30}"/>
+                <a16:creationId xmlns:a16="http://schemas.microsoft.com/office/drawing/2014/main" id="{A4914DCE-D688-4078-8CD0-D89FFA500C29}"/>
               </a:ext>
             </a:extLst>
           </p:cNvPr>
@@ -8002,33 +9390,41 @@
           <a:p>
             <a:r>
               <a:rPr lang="en-US" dirty="0"/>
-              <a:t>Like all build systems, CMake provides a way for you to pass command line options that affect the build system’s behavior</a:t>
-            </a:r>
-          </a:p>
-          <a:p>
-            <a:r>
-              <a:rPr lang="en-US" dirty="0"/>
-              <a:t>It’s also desirable to have a way to store the results of different tests so the buildscript runs faster when you run it subsequent times</a:t>
-            </a:r>
-          </a:p>
-          <a:p>
-            <a:r>
-              <a:rPr lang="en-US" dirty="0"/>
-              <a:t>For CMake, both of these are achieved through the same mechanism: cache variables</a:t>
-            </a:r>
-          </a:p>
-          <a:p>
-            <a:r>
-              <a:rPr lang="en-US" dirty="0"/>
-              <a:t>Cache variables are special variables that keep their values between invocations of CMake</a:t>
-            </a:r>
+              <a:t>Created by </a:t>
+            </a:r>
+            <a:r>
+              <a:rPr lang="en-US" dirty="0" err="1"/>
+              <a:t>add_executable</a:t>
+            </a:r>
+            <a:r>
+              <a:rPr lang="en-US" dirty="0"/>
+              <a:t>()</a:t>
+            </a:r>
+          </a:p>
+          <a:p>
+            <a:r>
+              <a:rPr lang="en-US" dirty="0"/>
+              <a:t>Create programs that can be run (.exe on Windows, no suffix on Mac)</a:t>
+            </a:r>
+          </a:p>
+          <a:p>
+            <a:r>
+              <a:rPr lang="en-US" dirty="0"/>
+              <a:t>On microcontrollers, e.g. MBed, these create images that can be programmed to the chip</a:t>
+            </a:r>
+          </a:p>
+          <a:p>
+            <a:endParaRPr lang="en-US" dirty="0"/>
+          </a:p>
+          <a:p>
+            <a:endParaRPr lang="en-US" dirty="0"/>
           </a:p>
         </p:txBody>
       </p:sp>
     </p:spTree>
     <p:extLst>
       <p:ext uri="{BB962C8B-B14F-4D97-AF65-F5344CB8AC3E}">
-        <p14:creationId xmlns:p14="http://schemas.microsoft.com/office/powerpoint/2010/main" val="270943617"/>
+        <p14:creationId xmlns:p14="http://schemas.microsoft.com/office/powerpoint/2010/main" val="566533349"/>
       </p:ext>
     </p:extLst>
   </p:cSld>
@@ -8060,7 +9456,7 @@
           <p:cNvPr id="2" name="Title 1">
             <a:extLst>
               <a:ext uri="{FF2B5EF4-FFF2-40B4-BE49-F238E27FC236}">
-                <a16:creationId xmlns:a16="http://schemas.microsoft.com/office/drawing/2014/main" id="{98B3228E-67E9-4BE2-B414-F7C88A23926C}"/>
+                <a16:creationId xmlns:a16="http://schemas.microsoft.com/office/drawing/2014/main" id="{8EA3E59D-09D9-480C-8819-5630EB7B8637}"/>
               </a:ext>
             </a:extLst>
           </p:cNvPr>
@@ -8078,7 +9474,7 @@
           <a:p>
             <a:r>
               <a:rPr lang="en-US" dirty="0"/>
-              <a:t>Creating Cache Variables</a:t>
+              <a:t>Static library targets</a:t>
             </a:r>
           </a:p>
         </p:txBody>
@@ -8088,7 +9484,7 @@
           <p:cNvPr id="3" name="Content Placeholder 2">
             <a:extLst>
               <a:ext uri="{FF2B5EF4-FFF2-40B4-BE49-F238E27FC236}">
-                <a16:creationId xmlns:a16="http://schemas.microsoft.com/office/drawing/2014/main" id="{6AEAB6F2-060F-4466-9BE0-E1E41F279D74}"/>
+                <a16:creationId xmlns:a16="http://schemas.microsoft.com/office/drawing/2014/main" id="{A4914DCE-D688-4078-8CD0-D89FFA500C29}"/>
               </a:ext>
             </a:extLst>
           </p:cNvPr>
@@ -8099,96 +9495,42 @@
             <p:ph idx="1"/>
           </p:nvPr>
         </p:nvSpPr>
-        <p:spPr>
-          <a:xfrm>
-            <a:off x="685801" y="1799112"/>
-            <a:ext cx="10131425" cy="4576973"/>
-          </a:xfrm>
-        </p:spPr>
-        <p:txBody>
-          <a:bodyPr>
-            <a:normAutofit/>
-          </a:bodyPr>
-          <a:lstStyle/>
-          <a:p>
-            <a:r>
-              <a:rPr lang="en-US" dirty="0"/>
-              <a:t>Cache variables are created using an alternate signature for set().</a:t>
-            </a:r>
-          </a:p>
-          <a:p>
-            <a:r>
-              <a:rPr lang="en-US" dirty="0"/>
-              <a:t>Signature: </a:t>
-            </a:r>
-            <a:r>
-              <a:rPr lang="en-US" sz="2000" dirty="0">
-                <a:latin typeface="Consolas" panose="020B0609020204030204" pitchFamily="49" charset="0"/>
-              </a:rPr>
-              <a:t>set(&lt;variable&gt; &lt;value&gt;... CACHE &lt;type&gt; &lt;docstring&gt; [FORCE])</a:t>
-            </a:r>
-          </a:p>
-          <a:p>
-            <a:r>
-              <a:rPr lang="en-US" dirty="0">
-                <a:latin typeface="Consolas" panose="020B0609020204030204" pitchFamily="49" charset="0"/>
-              </a:rPr>
-              <a:t>CACHE </a:t>
-            </a:r>
-            <a:r>
-              <a:rPr lang="en-US" dirty="0"/>
-              <a:t>keyword argument specifies cache signature</a:t>
-            </a:r>
-          </a:p>
-          <a:p>
-            <a:r>
-              <a:rPr lang="en-US" dirty="0"/>
-              <a:t>Type specifies the type of data that will be stored in the variable.</a:t>
-            </a:r>
-          </a:p>
-          <a:p>
-            <a:pPr lvl="1"/>
-            <a:r>
-              <a:rPr lang="en-US" dirty="0"/>
-              <a:t>Possible values:</a:t>
-            </a:r>
-            <a:r>
-              <a:rPr lang="en-US" dirty="0">
-                <a:latin typeface="Consolas" panose="020B0609020204030204" pitchFamily="49" charset="0"/>
-              </a:rPr>
-              <a:t> BOOL, FILEPATH, PATH, STRING, INTERNAL</a:t>
-            </a:r>
-          </a:p>
-          <a:p>
-            <a:r>
-              <a:rPr lang="en-US" dirty="0"/>
-              <a:t>Docstring is the comment that will be attached to the variable in the cache</a:t>
-            </a:r>
-          </a:p>
-          <a:p>
-            <a:r>
-              <a:rPr lang="en-US" dirty="0"/>
-              <a:t>If FORCE is given, the variable’s value will be overwritten.  Otherwise it will not be modified if it already exists</a:t>
-            </a:r>
-          </a:p>
-          <a:p>
-            <a:pPr lvl="1"/>
-            <a:r>
-              <a:rPr lang="en-US" dirty="0"/>
-              <a:t>Why is this?</a:t>
-            </a:r>
-          </a:p>
-          <a:p>
-            <a:endParaRPr lang="en-US" dirty="0">
-              <a:latin typeface="Consolas" panose="020B0609020204030204" pitchFamily="49" charset="0"/>
-            </a:endParaRPr>
+        <p:spPr/>
+        <p:txBody>
+          <a:bodyPr/>
+          <a:lstStyle/>
+          <a:p>
+            <a:r>
+              <a:rPr lang="en-US" dirty="0"/>
+              <a:t>Created by </a:t>
+            </a:r>
+            <a:r>
+              <a:rPr lang="en-US" dirty="0" err="1"/>
+              <a:t>add_library</a:t>
+            </a:r>
+            <a:r>
+              <a:rPr lang="en-US" dirty="0"/>
+              <a:t>(STATIC)</a:t>
+            </a:r>
+          </a:p>
+          <a:p>
+            <a:r>
+              <a:rPr lang="en-US" dirty="0"/>
+              <a:t>Create static libraries of code that can be linked into executables (.lib on Windows MSVC, .a elsewhere)</a:t>
+            </a:r>
+          </a:p>
+          <a:p>
+            <a:endParaRPr lang="en-US" dirty="0"/>
+          </a:p>
+          <a:p>
+            <a:endParaRPr lang="en-US" dirty="0"/>
           </a:p>
         </p:txBody>
       </p:sp>
     </p:spTree>
     <p:extLst>
       <p:ext uri="{BB962C8B-B14F-4D97-AF65-F5344CB8AC3E}">
-        <p14:creationId xmlns:p14="http://schemas.microsoft.com/office/powerpoint/2010/main" val="3970434297"/>
+        <p14:creationId xmlns:p14="http://schemas.microsoft.com/office/powerpoint/2010/main" val="1308973904"/>
       </p:ext>
     </p:extLst>
   </p:cSld>
@@ -8220,7 +9562,7 @@
           <p:cNvPr id="2" name="Title 1">
             <a:extLst>
               <a:ext uri="{FF2B5EF4-FFF2-40B4-BE49-F238E27FC236}">
-                <a16:creationId xmlns:a16="http://schemas.microsoft.com/office/drawing/2014/main" id="{317E8905-8AD5-4C2F-B7DB-4592C245C201}"/>
+                <a16:creationId xmlns:a16="http://schemas.microsoft.com/office/drawing/2014/main" id="{8EA3E59D-09D9-480C-8819-5630EB7B8637}"/>
               </a:ext>
             </a:extLst>
           </p:cNvPr>
@@ -8238,7 +9580,7 @@
           <a:p>
             <a:r>
               <a:rPr lang="en-US" dirty="0"/>
-              <a:t>Command Line Options</a:t>
+              <a:t>Object library targets</a:t>
             </a:r>
           </a:p>
         </p:txBody>
@@ -8248,7 +9590,7 @@
           <p:cNvPr id="3" name="Content Placeholder 2">
             <a:extLst>
               <a:ext uri="{FF2B5EF4-FFF2-40B4-BE49-F238E27FC236}">
-                <a16:creationId xmlns:a16="http://schemas.microsoft.com/office/drawing/2014/main" id="{20D66013-A24F-4663-8232-2C2A0322B7A8}"/>
+                <a16:creationId xmlns:a16="http://schemas.microsoft.com/office/drawing/2014/main" id="{A4914DCE-D688-4078-8CD0-D89FFA500C29}"/>
               </a:ext>
             </a:extLst>
           </p:cNvPr>
@@ -8259,26 +9601,54 @@
             <p:ph idx="1"/>
           </p:nvPr>
         </p:nvSpPr>
-        <p:spPr/>
-        <p:txBody>
-          <a:bodyPr/>
-          <a:lstStyle/>
-          <a:p>
-            <a:r>
-              <a:rPr lang="en-US" dirty="0"/>
-              <a:t>Cache variables can also be set on the command line using –DMY_CACHE_VAR=&lt;value&gt;</a:t>
-            </a:r>
-          </a:p>
-          <a:p>
-            <a:r>
-              <a:rPr lang="en-US" dirty="0"/>
-              <a:t>Intention is for set(CACHE) to be used to initialize an option with a default value, and then the user can override it on the command line</a:t>
-            </a:r>
-          </a:p>
-          <a:p>
-            <a:r>
-              <a:rPr lang="en-US" dirty="0"/>
-              <a:t>However, sometimes scripts need to store data even though it isn’t a settable option.  This is what the INTERNAL type, which hides the variable from the user, is for</a:t>
+        <p:spPr>
+          <a:xfrm>
+            <a:off x="685801" y="2039815"/>
+            <a:ext cx="10131425" cy="3751386"/>
+          </a:xfrm>
+        </p:spPr>
+        <p:txBody>
+          <a:bodyPr>
+            <a:normAutofit/>
+          </a:bodyPr>
+          <a:lstStyle/>
+          <a:p>
+            <a:r>
+              <a:rPr lang="en-US" dirty="0"/>
+              <a:t>Created by </a:t>
+            </a:r>
+            <a:r>
+              <a:rPr lang="en-US" dirty="0" err="1"/>
+              <a:t>add_library</a:t>
+            </a:r>
+            <a:r>
+              <a:rPr lang="en-US" dirty="0"/>
+              <a:t>(OBJECT)</a:t>
+            </a:r>
+          </a:p>
+          <a:p>
+            <a:r>
+              <a:rPr lang="en-US" dirty="0"/>
+              <a:t>Create object libraries: code compiled into .o files but not combined into a single library</a:t>
+            </a:r>
+          </a:p>
+          <a:p>
+            <a:r>
+              <a:rPr lang="en-US" dirty="0"/>
+              <a:t>Function very similar to STATIC libraries, used in certain specific cases</a:t>
+            </a:r>
+          </a:p>
+          <a:p>
+            <a:pPr lvl="1"/>
+            <a:r>
+              <a:rPr lang="en-US" dirty="0"/>
+              <a:t>Most common use: improving performance by only building certain code files once that are needed for multiple targets</a:t>
+            </a:r>
+          </a:p>
+          <a:p>
+            <a:r>
+              <a:rPr lang="en-US" dirty="0"/>
+              <a:t>You likely won’t need to use these except for very complicated build systems!</a:t>
             </a:r>
           </a:p>
           <a:p>
@@ -8289,7 +9659,7 @@
     </p:spTree>
     <p:extLst>
       <p:ext uri="{BB962C8B-B14F-4D97-AF65-F5344CB8AC3E}">
-        <p14:creationId xmlns:p14="http://schemas.microsoft.com/office/powerpoint/2010/main" val="1356219004"/>
+        <p14:creationId xmlns:p14="http://schemas.microsoft.com/office/powerpoint/2010/main" val="1621585153"/>
       </p:ext>
     </p:extLst>
   </p:cSld>
@@ -8321,7 +9691,7 @@
           <p:cNvPr id="2" name="Title 1">
             <a:extLst>
               <a:ext uri="{FF2B5EF4-FFF2-40B4-BE49-F238E27FC236}">
-                <a16:creationId xmlns:a16="http://schemas.microsoft.com/office/drawing/2014/main" id="{FFEDEB4D-1F8C-4956-9439-86169BC4066D}"/>
+                <a16:creationId xmlns:a16="http://schemas.microsoft.com/office/drawing/2014/main" id="{114B62C8-E449-437E-9B01-5791A320D526}"/>
               </a:ext>
             </a:extLst>
           </p:cNvPr>
@@ -8339,7 +9709,7 @@
           <a:p>
             <a:r>
               <a:rPr lang="en-US" dirty="0"/>
-              <a:t>Viewing Cache Variables</a:t>
+              <a:t>Properties can be used to configure the build further</a:t>
             </a:r>
           </a:p>
         </p:txBody>
@@ -8349,7 +9719,7 @@
           <p:cNvPr id="3" name="Content Placeholder 2">
             <a:extLst>
               <a:ext uri="{FF2B5EF4-FFF2-40B4-BE49-F238E27FC236}">
-                <a16:creationId xmlns:a16="http://schemas.microsoft.com/office/drawing/2014/main" id="{7F13293D-8F31-47C5-A938-818E46AAB199}"/>
+                <a16:creationId xmlns:a16="http://schemas.microsoft.com/office/drawing/2014/main" id="{6E19BE73-24A9-44DF-AF97-983640971230}"/>
               </a:ext>
             </a:extLst>
           </p:cNvPr>
@@ -8360,84 +9730,80 @@
             <p:ph idx="1"/>
           </p:nvPr>
         </p:nvSpPr>
-        <p:spPr>
-          <a:xfrm>
-            <a:off x="685801" y="1799112"/>
-            <a:ext cx="10131425" cy="4626401"/>
-          </a:xfrm>
-        </p:spPr>
+        <p:spPr/>
         <p:txBody>
           <a:bodyPr>
-            <a:normAutofit/>
+            <a:normAutofit lnSpcReduction="10000"/>
           </a:bodyPr>
           <a:lstStyle/>
           <a:p>
             <a:r>
               <a:rPr lang="en-US" dirty="0"/>
-              <a:t>Cache variables can be viewed and edited by:</a:t>
+              <a:t>What you can’t accomplish through functions in CMake, you accomplish through properties.</a:t>
+            </a:r>
+          </a:p>
+          <a:p>
+            <a:r>
+              <a:rPr lang="en-US" dirty="0"/>
+              <a:t>Properties determine the specific details of how CMake builds your code, such as compile flags and link libraries</a:t>
+            </a:r>
+          </a:p>
+          <a:p>
+            <a:r>
+              <a:rPr lang="en-US" dirty="0"/>
+              <a:t>Properties can be set on a number of different levels:</a:t>
             </a:r>
           </a:p>
           <a:p>
             <a:pPr lvl="1"/>
             <a:r>
               <a:rPr lang="en-US" dirty="0"/>
-              <a:t>Editing CMakeCache.txt</a:t>
+              <a:t>Global (affects the entire project)</a:t>
             </a:r>
           </a:p>
           <a:p>
             <a:pPr lvl="1"/>
             <a:r>
               <a:rPr lang="en-US" dirty="0"/>
-              <a:t>Using the </a:t>
-            </a:r>
-            <a:r>
-              <a:rPr lang="en-US" dirty="0" err="1"/>
-              <a:t>ccmake</a:t>
-            </a:r>
-            <a:r>
-              <a:rPr lang="en-US" dirty="0"/>
-              <a:t> tool</a:t>
+              <a:t>Directory (affects the current directory and all subdirectories)</a:t>
             </a:r>
           </a:p>
           <a:p>
             <a:pPr lvl="1"/>
             <a:r>
               <a:rPr lang="en-US" dirty="0"/>
-              <a:t>Using the </a:t>
-            </a:r>
-            <a:r>
-              <a:rPr lang="en-US" dirty="0" err="1"/>
-              <a:t>cmake-gui</a:t>
-            </a:r>
-            <a:r>
-              <a:rPr lang="en-US" dirty="0"/>
-              <a:t> tool</a:t>
-            </a:r>
-          </a:p>
-          <a:p>
-            <a:r>
-              <a:rPr lang="en-US" dirty="0"/>
-              <a:t>The intention was for these to provide a user-friendly interface for configuring CMake projects</a:t>
-            </a:r>
-          </a:p>
-          <a:p>
-            <a:r>
-              <a:rPr lang="en-US" dirty="0"/>
-              <a:t>However, 95% of users don’t know these exist, so developers don’t usually spend time making them clean and usable, so people rarely use them</a:t>
-            </a:r>
-          </a:p>
-          <a:p>
-            <a:r>
-              <a:rPr lang="en-US" dirty="0"/>
-              <a:t>Bit of a chicken-and-egg problem…</a:t>
-            </a:r>
+              <a:t>Target (affects a specific target)</a:t>
+            </a:r>
+          </a:p>
+          <a:p>
+            <a:pPr lvl="1"/>
+            <a:r>
+              <a:rPr lang="en-US" dirty="0"/>
+              <a:t>Source (affects a specific source file in </a:t>
+            </a:r>
+            <a:r>
+              <a:rPr lang="en-US" i="1" dirty="0"/>
+              <a:t>all</a:t>
+            </a:r>
+            <a:r>
+              <a:rPr lang="en-US" dirty="0"/>
+              <a:t> targets it’s </a:t>
+            </a:r>
+            <a:r>
+              <a:rPr lang="en-US"/>
+              <a:t>present in)</a:t>
+            </a:r>
+            <a:endParaRPr lang="en-US" dirty="0"/>
+          </a:p>
+          <a:p>
+            <a:endParaRPr lang="en-US" dirty="0"/>
           </a:p>
         </p:txBody>
       </p:sp>
     </p:spTree>
     <p:extLst>
       <p:ext uri="{BB962C8B-B14F-4D97-AF65-F5344CB8AC3E}">
-        <p14:creationId xmlns:p14="http://schemas.microsoft.com/office/powerpoint/2010/main" val="2843450251"/>
+        <p14:creationId xmlns:p14="http://schemas.microsoft.com/office/powerpoint/2010/main" val="4247406788"/>
       </p:ext>
     </p:extLst>
   </p:cSld>
@@ -8694,4 +10060,299 @@
     </a:ext>
   </a:extLst>
 </a:theme>
+</file>
+
+<file path=ppt/theme/theme2.xml><?xml version="1.0" encoding="utf-8"?>
+<a:theme xmlns:a="http://schemas.openxmlformats.org/drawingml/2006/main" name="Office Theme">
+  <a:themeElements>
+    <a:clrScheme name="Office">
+      <a:dk1>
+        <a:sysClr val="windowText" lastClr="000000"/>
+      </a:dk1>
+      <a:lt1>
+        <a:sysClr val="window" lastClr="FFFFFF"/>
+      </a:lt1>
+      <a:dk2>
+        <a:srgbClr val="44546A"/>
+      </a:dk2>
+      <a:lt2>
+        <a:srgbClr val="E7E6E6"/>
+      </a:lt2>
+      <a:accent1>
+        <a:srgbClr val="4472C4"/>
+      </a:accent1>
+      <a:accent2>
+        <a:srgbClr val="ED7D31"/>
+      </a:accent2>
+      <a:accent3>
+        <a:srgbClr val="A5A5A5"/>
+      </a:accent3>
+      <a:accent4>
+        <a:srgbClr val="FFC000"/>
+      </a:accent4>
+      <a:accent5>
+        <a:srgbClr val="5B9BD5"/>
+      </a:accent5>
+      <a:accent6>
+        <a:srgbClr val="70AD47"/>
+      </a:accent6>
+      <a:hlink>
+        <a:srgbClr val="0563C1"/>
+      </a:hlink>
+      <a:folHlink>
+        <a:srgbClr val="954F72"/>
+      </a:folHlink>
+    </a:clrScheme>
+    <a:fontScheme name="Office">
+      <a:majorFont>
+        <a:latin typeface="Calibri Light" panose="020F0302020204030204"/>
+        <a:ea typeface=""/>
+        <a:cs typeface=""/>
+        <a:font script="Jpan" typeface="游ゴシック Light"/>
+        <a:font script="Hang" typeface="맑은 고딕"/>
+        <a:font script="Hans" typeface="等线 Light"/>
+        <a:font script="Hant" typeface="新細明體"/>
+        <a:font script="Arab" typeface="Times New Roman"/>
+        <a:font script="Hebr" typeface="Times New Roman"/>
+        <a:font script="Thai" typeface="Angsana New"/>
+        <a:font script="Ethi" typeface="Nyala"/>
+        <a:font script="Beng" typeface="Vrinda"/>
+        <a:font script="Gujr" typeface="Shruti"/>
+        <a:font script="Khmr" typeface="MoolBoran"/>
+        <a:font script="Knda" typeface="Tunga"/>
+        <a:font script="Guru" typeface="Raavi"/>
+        <a:font script="Cans" typeface="Euphemia"/>
+        <a:font script="Cher" typeface="Plantagenet Cherokee"/>
+        <a:font script="Yiii" typeface="Microsoft Yi Baiti"/>
+        <a:font script="Tibt" typeface="Microsoft Himalaya"/>
+        <a:font script="Thaa" typeface="MV Boli"/>
+        <a:font script="Deva" typeface="Mangal"/>
+        <a:font script="Telu" typeface="Gautami"/>
+        <a:font script="Taml" typeface="Latha"/>
+        <a:font script="Syrc" typeface="Estrangelo Edessa"/>
+        <a:font script="Orya" typeface="Kalinga"/>
+        <a:font script="Mlym" typeface="Kartika"/>
+        <a:font script="Laoo" typeface="DokChampa"/>
+        <a:font script="Sinh" typeface="Iskoola Pota"/>
+        <a:font script="Mong" typeface="Mongolian Baiti"/>
+        <a:font script="Viet" typeface="Times New Roman"/>
+        <a:font script="Uigh" typeface="Microsoft Uighur"/>
+        <a:font script="Geor" typeface="Sylfaen"/>
+        <a:font script="Armn" typeface="Arial"/>
+        <a:font script="Bugi" typeface="Leelawadee UI"/>
+        <a:font script="Bopo" typeface="Microsoft JhengHei"/>
+        <a:font script="Java" typeface="Javanese Text"/>
+        <a:font script="Lisu" typeface="Segoe UI"/>
+        <a:font script="Mymr" typeface="Myanmar Text"/>
+        <a:font script="Nkoo" typeface="Ebrima"/>
+        <a:font script="Olck" typeface="Nirmala UI"/>
+        <a:font script="Osma" typeface="Ebrima"/>
+        <a:font script="Phag" typeface="Phagspa"/>
+        <a:font script="Syrn" typeface="Estrangelo Edessa"/>
+        <a:font script="Syrj" typeface="Estrangelo Edessa"/>
+        <a:font script="Syre" typeface="Estrangelo Edessa"/>
+        <a:font script="Sora" typeface="Nirmala UI"/>
+        <a:font script="Tale" typeface="Microsoft Tai Le"/>
+        <a:font script="Talu" typeface="Microsoft New Tai Lue"/>
+        <a:font script="Tfng" typeface="Ebrima"/>
+      </a:majorFont>
+      <a:minorFont>
+        <a:latin typeface="Calibri" panose="020F0502020204030204"/>
+        <a:ea typeface=""/>
+        <a:cs typeface=""/>
+        <a:font script="Jpan" typeface="游ゴシック"/>
+        <a:font script="Hang" typeface="맑은 고딕"/>
+        <a:font script="Hans" typeface="等线"/>
+        <a:font script="Hant" typeface="新細明體"/>
+        <a:font script="Arab" typeface="Arial"/>
+        <a:font script="Hebr" typeface="Arial"/>
+        <a:font script="Thai" typeface="Cordia New"/>
+        <a:font script="Ethi" typeface="Nyala"/>
+        <a:font script="Beng" typeface="Vrinda"/>
+        <a:font script="Gujr" typeface="Shruti"/>
+        <a:font script="Khmr" typeface="DaunPenh"/>
+        <a:font script="Knda" typeface="Tunga"/>
+        <a:font script="Guru" typeface="Raavi"/>
+        <a:font script="Cans" typeface="Euphemia"/>
+        <a:font script="Cher" typeface="Plantagenet Cherokee"/>
+        <a:font script="Yiii" typeface="Microsoft Yi Baiti"/>
+        <a:font script="Tibt" typeface="Microsoft Himalaya"/>
+        <a:font script="Thaa" typeface="MV Boli"/>
+        <a:font script="Deva" typeface="Mangal"/>
+        <a:font script="Telu" typeface="Gautami"/>
+        <a:font script="Taml" typeface="Latha"/>
+        <a:font script="Syrc" typeface="Estrangelo Edessa"/>
+        <a:font script="Orya" typeface="Kalinga"/>
+        <a:font script="Mlym" typeface="Kartika"/>
+        <a:font script="Laoo" typeface="DokChampa"/>
+        <a:font script="Sinh" typeface="Iskoola Pota"/>
+        <a:font script="Mong" typeface="Mongolian Baiti"/>
+        <a:font script="Viet" typeface="Arial"/>
+        <a:font script="Uigh" typeface="Microsoft Uighur"/>
+        <a:font script="Geor" typeface="Sylfaen"/>
+        <a:font script="Armn" typeface="Arial"/>
+        <a:font script="Bugi" typeface="Leelawadee UI"/>
+        <a:font script="Bopo" typeface="Microsoft JhengHei"/>
+        <a:font script="Java" typeface="Javanese Text"/>
+        <a:font script="Lisu" typeface="Segoe UI"/>
+        <a:font script="Mymr" typeface="Myanmar Text"/>
+        <a:font script="Nkoo" typeface="Ebrima"/>
+        <a:font script="Olck" typeface="Nirmala UI"/>
+        <a:font script="Osma" typeface="Ebrima"/>
+        <a:font script="Phag" typeface="Phagspa"/>
+        <a:font script="Syrn" typeface="Estrangelo Edessa"/>
+        <a:font script="Syrj" typeface="Estrangelo Edessa"/>
+        <a:font script="Syre" typeface="Estrangelo Edessa"/>
+        <a:font script="Sora" typeface="Nirmala UI"/>
+        <a:font script="Tale" typeface="Microsoft Tai Le"/>
+        <a:font script="Talu" typeface="Microsoft New Tai Lue"/>
+        <a:font script="Tfng" typeface="Ebrima"/>
+      </a:minorFont>
+    </a:fontScheme>
+    <a:fmtScheme name="Office">
+      <a:fillStyleLst>
+        <a:solidFill>
+          <a:schemeClr val="phClr"/>
+        </a:solidFill>
+        <a:gradFill rotWithShape="1">
+          <a:gsLst>
+            <a:gs pos="0">
+              <a:schemeClr val="phClr">
+                <a:lumMod val="110000"/>
+                <a:satMod val="105000"/>
+                <a:tint val="67000"/>
+              </a:schemeClr>
+            </a:gs>
+            <a:gs pos="50000">
+              <a:schemeClr val="phClr">
+                <a:lumMod val="105000"/>
+                <a:satMod val="103000"/>
+                <a:tint val="73000"/>
+              </a:schemeClr>
+            </a:gs>
+            <a:gs pos="100000">
+              <a:schemeClr val="phClr">
+                <a:lumMod val="105000"/>
+                <a:satMod val="109000"/>
+                <a:tint val="81000"/>
+              </a:schemeClr>
+            </a:gs>
+          </a:gsLst>
+          <a:lin ang="5400000" scaled="0"/>
+        </a:gradFill>
+        <a:gradFill rotWithShape="1">
+          <a:gsLst>
+            <a:gs pos="0">
+              <a:schemeClr val="phClr">
+                <a:satMod val="103000"/>
+                <a:lumMod val="102000"/>
+                <a:tint val="94000"/>
+              </a:schemeClr>
+            </a:gs>
+            <a:gs pos="50000">
+              <a:schemeClr val="phClr">
+                <a:satMod val="110000"/>
+                <a:lumMod val="100000"/>
+                <a:shade val="100000"/>
+              </a:schemeClr>
+            </a:gs>
+            <a:gs pos="100000">
+              <a:schemeClr val="phClr">
+                <a:lumMod val="99000"/>
+                <a:satMod val="120000"/>
+                <a:shade val="78000"/>
+              </a:schemeClr>
+            </a:gs>
+          </a:gsLst>
+          <a:lin ang="5400000" scaled="0"/>
+        </a:gradFill>
+      </a:fillStyleLst>
+      <a:lnStyleLst>
+        <a:ln w="6350" cap="flat" cmpd="sng" algn="ctr">
+          <a:solidFill>
+            <a:schemeClr val="phClr"/>
+          </a:solidFill>
+          <a:prstDash val="solid"/>
+          <a:miter lim="800000"/>
+        </a:ln>
+        <a:ln w="12700" cap="flat" cmpd="sng" algn="ctr">
+          <a:solidFill>
+            <a:schemeClr val="phClr"/>
+          </a:solidFill>
+          <a:prstDash val="solid"/>
+          <a:miter lim="800000"/>
+        </a:ln>
+        <a:ln w="19050" cap="flat" cmpd="sng" algn="ctr">
+          <a:solidFill>
+            <a:schemeClr val="phClr"/>
+          </a:solidFill>
+          <a:prstDash val="solid"/>
+          <a:miter lim="800000"/>
+        </a:ln>
+      </a:lnStyleLst>
+      <a:effectStyleLst>
+        <a:effectStyle>
+          <a:effectLst/>
+        </a:effectStyle>
+        <a:effectStyle>
+          <a:effectLst/>
+        </a:effectStyle>
+        <a:effectStyle>
+          <a:effectLst>
+            <a:outerShdw blurRad="57150" dist="19050" dir="5400000" algn="ctr" rotWithShape="0">
+              <a:srgbClr val="000000">
+                <a:alpha val="63000"/>
+              </a:srgbClr>
+            </a:outerShdw>
+          </a:effectLst>
+        </a:effectStyle>
+      </a:effectStyleLst>
+      <a:bgFillStyleLst>
+        <a:solidFill>
+          <a:schemeClr val="phClr"/>
+        </a:solidFill>
+        <a:solidFill>
+          <a:schemeClr val="phClr">
+            <a:tint val="95000"/>
+            <a:satMod val="170000"/>
+          </a:schemeClr>
+        </a:solidFill>
+        <a:gradFill rotWithShape="1">
+          <a:gsLst>
+            <a:gs pos="0">
+              <a:schemeClr val="phClr">
+                <a:tint val="93000"/>
+                <a:satMod val="150000"/>
+                <a:shade val="98000"/>
+                <a:lumMod val="102000"/>
+              </a:schemeClr>
+            </a:gs>
+            <a:gs pos="50000">
+              <a:schemeClr val="phClr">
+                <a:tint val="98000"/>
+                <a:satMod val="130000"/>
+                <a:shade val="90000"/>
+                <a:lumMod val="103000"/>
+              </a:schemeClr>
+            </a:gs>
+            <a:gs pos="100000">
+              <a:schemeClr val="phClr">
+                <a:shade val="63000"/>
+                <a:satMod val="120000"/>
+              </a:schemeClr>
+            </a:gs>
+          </a:gsLst>
+          <a:lin ang="5400000" scaled="0"/>
+        </a:gradFill>
+      </a:bgFillStyleLst>
+    </a:fmtScheme>
+  </a:themeElements>
+  <a:objectDefaults/>
+  <a:extraClrSchemeLst/>
+  <a:extLst>
+    <a:ext uri="{05A4C25C-085E-4340-85A3-A5531E510DB2}">
+      <thm15:themeFamily xmlns:thm15="http://schemas.microsoft.com/office/thememl/2012/main" name="Office Theme" id="{62F939B6-93AF-4DB8-9C6B-D6C7DFDC589F}" vid="{4A3C46E8-61CC-4603-A589-7422A47A8E4A}"/>
+    </a:ext>
+  </a:extLst>
+</a:theme>
 </file>
</xml_diff>